<commit_message>
präsentation slide gemacht / kommentar pfad angepasst
</commit_message>
<xml_diff>
--- a/docs/Präsentation_Schlussbericht.pptx
+++ b/docs/Präsentation_Schlussbericht.pptx
@@ -19,7 +19,7 @@
     <p:sldId id="262" r:id="rId8"/>
     <p:sldId id="267" r:id="rId9"/>
     <p:sldId id="266" r:id="rId10"/>
-    <p:sldId id="265" r:id="rId11"/>
+    <p:sldId id="269" r:id="rId11"/>
     <p:sldId id="268" r:id="rId12"/>
   </p:sldIdLst>
   <p:sldSz cx="12192000" cy="6858000"/>
@@ -233,7 +233,7 @@
           <a:p>
             <a:fld id="{68796EA6-6F25-4F19-87BA-7ADCC16DAEFF}" type="datetimeFigureOut">
               <a:rPr lang="en-US" smtClean="0"/>
-              <a:t>1/9/2016</a:t>
+              <a:t>1/11/2016</a:t>
             </a:fld>
             <a:endParaRPr lang="en-US" dirty="0"/>
           </a:p>
@@ -398,7 +398,7 @@
           <a:p>
             <a:fld id="{C39C172E-A8B5-46F6-B05C-DFA3E2E0F207}" type="datetimeFigureOut">
               <a:rPr lang="en-US" smtClean="0"/>
-              <a:t>1/9/2016</a:t>
+              <a:t>1/11/2016</a:t>
             </a:fld>
             <a:endParaRPr lang="en-US" dirty="0"/>
           </a:p>
@@ -1635,7 +1635,7 @@
           <a:p>
             <a:fld id="{4E708F12-96AD-4ED4-8132-A78F5E42C1F5}" type="datetime1">
               <a:rPr lang="en-US" smtClean="0"/>
-              <a:t>1/9/2016</a:t>
+              <a:t>1/11/2016</a:t>
             </a:fld>
             <a:endParaRPr lang="en-US" dirty="0"/>
           </a:p>
@@ -1857,7 +1857,7 @@
           <a:p>
             <a:fld id="{7B7FA170-8299-44AD-AEEF-FC686C3D7804}" type="datetime1">
               <a:rPr lang="en-US" smtClean="0"/>
-              <a:t>1/9/2016</a:t>
+              <a:t>1/11/2016</a:t>
             </a:fld>
             <a:endParaRPr lang="en-US" dirty="0"/>
           </a:p>
@@ -2039,7 +2039,7 @@
           <a:p>
             <a:fld id="{2231763A-68EC-4ECD-9620-D9FE9CDDD622}" type="datetime1">
               <a:rPr lang="en-US" smtClean="0"/>
-              <a:t>1/9/2016</a:t>
+              <a:t>1/11/2016</a:t>
             </a:fld>
             <a:endParaRPr lang="en-US" dirty="0"/>
           </a:p>
@@ -2231,7 +2231,7 @@
           <a:p>
             <a:fld id="{7B98BEDD-6160-49BB-B372-861DE7DE9BA5}" type="datetime1">
               <a:rPr lang="en-US" smtClean="0"/>
-              <a:t>1/9/2016</a:t>
+              <a:t>1/11/2016</a:t>
             </a:fld>
             <a:endParaRPr lang="en-US" dirty="0"/>
           </a:p>
@@ -2413,7 +2413,7 @@
           <a:p>
             <a:fld id="{0AAE819F-B7FD-4B29-8F66-9E318144BC2A}" type="datetime1">
               <a:rPr lang="en-US" smtClean="0"/>
-              <a:t>1/9/2016</a:t>
+              <a:t>1/11/2016</a:t>
             </a:fld>
             <a:endParaRPr lang="en-US" dirty="0"/>
           </a:p>
@@ -2645,7 +2645,7 @@
           <a:p>
             <a:fld id="{D4CA159C-B6E0-4F10-9F4A-2FA57003B139}" type="datetime1">
               <a:rPr lang="en-US" smtClean="0"/>
-              <a:t>1/9/2016</a:t>
+              <a:t>1/11/2016</a:t>
             </a:fld>
             <a:endParaRPr lang="en-US" dirty="0"/>
           </a:p>
@@ -2937,7 +2937,7 @@
           <a:p>
             <a:fld id="{8170CBBB-D1D1-4386-A5E9-07F3477B78F3}" type="datetime1">
               <a:rPr lang="en-US" smtClean="0"/>
-              <a:t>1/9/2016</a:t>
+              <a:t>1/11/2016</a:t>
             </a:fld>
             <a:endParaRPr lang="en-US" dirty="0"/>
           </a:p>
@@ -3365,7 +3365,7 @@
           <a:p>
             <a:fld id="{9FA4CAD8-0EA7-4615-B69B-B2F199EF3A93}" type="datetime1">
               <a:rPr lang="en-US" smtClean="0"/>
-              <a:t>1/9/2016</a:t>
+              <a:t>1/11/2016</a:t>
             </a:fld>
             <a:endParaRPr lang="en-US" dirty="0"/>
           </a:p>
@@ -3518,7 +3518,7 @@
           <a:p>
             <a:fld id="{B9234BD7-6953-492C-921B-E68B2D7F14C8}" type="datetime1">
               <a:rPr lang="en-US" smtClean="0"/>
-              <a:t>1/9/2016</a:t>
+              <a:t>1/11/2016</a:t>
             </a:fld>
             <a:endParaRPr lang="en-US" dirty="0"/>
           </a:p>
@@ -3625,7 +3625,7 @@
           <a:p>
             <a:fld id="{35A17D9B-D4D3-4E23-88DF-2E354FA43196}" type="datetime1">
               <a:rPr lang="en-US" smtClean="0"/>
-              <a:t>1/9/2016</a:t>
+              <a:t>1/11/2016</a:t>
             </a:fld>
             <a:endParaRPr lang="en-US" dirty="0"/>
           </a:p>
@@ -3887,7 +3887,7 @@
           <a:p>
             <a:fld id="{541F67C5-D04E-4576-B61C-12ABA14BBD6C}" type="datetime1">
               <a:rPr lang="en-US" smtClean="0"/>
-              <a:t>1/9/2016</a:t>
+              <a:t>1/11/2016</a:t>
             </a:fld>
             <a:endParaRPr lang="en-US" dirty="0"/>
           </a:p>
@@ -4787,7 +4787,7 @@
           <a:p>
             <a:fld id="{C20F09E4-6EA4-4BF3-9FC8-FF40373B88E6}" type="datetime1">
               <a:rPr lang="en-US" smtClean="0"/>
-              <a:t>1/9/2016</a:t>
+              <a:t>1/11/2016</a:t>
             </a:fld>
             <a:endParaRPr lang="en-US" dirty="0"/>
           </a:p>
@@ -7107,11 +7107,7 @@
             </a:r>
             <a:r>
               <a:rPr lang="en-GB" dirty="0" err="1" smtClean="0"/>
-              <a:t>Num</a:t>
-            </a:r>
-            <a:r>
-              <a:rPr lang="en-GB" dirty="0" err="1" smtClean="0"/>
-              <a:t>Ratio</a:t>
+              <a:t>NumRatio</a:t>
             </a:r>
             <a:r>
               <a:rPr lang="en-GB" dirty="0" smtClean="0"/>
@@ -7304,8 +7300,25 @@
           <a:bodyPr/>
           <a:lstStyle/>
           <a:p>
+            <a:r>
+              <a:rPr lang="de-CH" dirty="0" smtClean="0"/>
+              <a:t>Beispiel rationale Zahl –281/280</a:t>
+            </a:r>
+          </a:p>
+          <a:p>
+            <a:r>
+              <a:rPr lang="de-CH" dirty="0"/>
+              <a:t>debugout -281/280 // Ausgabe: -1.003(571428</a:t>
+            </a:r>
+            <a:r>
+              <a:rPr lang="de-CH" dirty="0" smtClean="0"/>
+              <a:t>)</a:t>
+            </a:r>
             <a:endParaRPr lang="en-GB" dirty="0"/>
           </a:p>
+          <a:p>
+            <a:endParaRPr lang="en-GB" dirty="0"/>
+          </a:p>
         </p:txBody>
       </p:sp>
       <p:sp>
@@ -7324,29 +7337,310 @@
           <a:lstStyle/>
           <a:p>
             <a:r>
-              <a:rPr lang="en-GB" dirty="0" smtClean="0"/>
-              <a:t>VM: </a:t>
-            </a:r>
-            <a:r>
-              <a:rPr lang="en-GB" dirty="0" err="1" smtClean="0"/>
-              <a:t>Ausgabe</a:t>
-            </a:r>
-            <a:r>
-              <a:rPr lang="en-GB" dirty="0" smtClean="0"/>
-              <a:t> von rationale </a:t>
-            </a:r>
-            <a:r>
-              <a:rPr lang="en-GB" dirty="0" err="1" smtClean="0"/>
-              <a:t>Zahlen</a:t>
+              <a:rPr lang="de-CH" dirty="0" smtClean="0"/>
+              <a:t>VM: Ausgabe von rationalen Zahlen	</a:t>
             </a:r>
             <a:endParaRPr lang="en-GB" dirty="0"/>
           </a:p>
         </p:txBody>
       </p:sp>
+      <p:graphicFrame>
+        <p:nvGraphicFramePr>
+          <p:cNvPr id="4" name="Content Placeholder 3"/>
+          <p:cNvGraphicFramePr>
+            <a:graphicFrameLocks/>
+          </p:cNvGraphicFramePr>
+          <p:nvPr>
+            <p:extLst>
+              <p:ext uri="{D42A27DB-BD31-4B8C-83A1-F6EECF244321}">
+                <p14:modId xmlns:p14="http://schemas.microsoft.com/office/powerpoint/2010/main" val="3205942763"/>
+              </p:ext>
+            </p:extLst>
+          </p:nvPr>
+        </p:nvGraphicFramePr>
+        <p:xfrm>
+          <a:off x="609599" y="3401060"/>
+          <a:ext cx="10972801" cy="1010920"/>
+        </p:xfrm>
+        <a:graphic>
+          <a:graphicData uri="http://schemas.openxmlformats.org/drawingml/2006/table">
+            <a:tbl>
+              <a:tblPr firstRow="1" bandRow="1">
+                <a:tableStyleId>{5C22544A-7EE6-4342-B048-85BDC9FD1C3A}</a:tableStyleId>
+              </a:tblPr>
+              <a:tblGrid>
+                <a:gridCol w="1567543">
+                  <a:extLst>
+                    <a:ext uri="{9D8B030D-6E8A-4147-A177-3AD203B41FA5}">
+                      <a16:colId xmlns:a16="http://schemas.microsoft.com/office/drawing/2014/main" val="3432858941"/>
+                    </a:ext>
+                  </a:extLst>
+                </a:gridCol>
+                <a:gridCol w="1567543">
+                  <a:extLst>
+                    <a:ext uri="{9D8B030D-6E8A-4147-A177-3AD203B41FA5}">
+                      <a16:colId xmlns:a16="http://schemas.microsoft.com/office/drawing/2014/main" val="685891753"/>
+                    </a:ext>
+                  </a:extLst>
+                </a:gridCol>
+                <a:gridCol w="1567543">
+                  <a:extLst>
+                    <a:ext uri="{9D8B030D-6E8A-4147-A177-3AD203B41FA5}">
+                      <a16:colId xmlns:a16="http://schemas.microsoft.com/office/drawing/2014/main" val="410249664"/>
+                    </a:ext>
+                  </a:extLst>
+                </a:gridCol>
+                <a:gridCol w="2020224">
+                  <a:extLst>
+                    <a:ext uri="{9D8B030D-6E8A-4147-A177-3AD203B41FA5}">
+                      <a16:colId xmlns:a16="http://schemas.microsoft.com/office/drawing/2014/main" val="2254893949"/>
+                    </a:ext>
+                  </a:extLst>
+                </a:gridCol>
+                <a:gridCol w="862641">
+                  <a:extLst>
+                    <a:ext uri="{9D8B030D-6E8A-4147-A177-3AD203B41FA5}">
+                      <a16:colId xmlns:a16="http://schemas.microsoft.com/office/drawing/2014/main" val="2351044014"/>
+                    </a:ext>
+                  </a:extLst>
+                </a:gridCol>
+                <a:gridCol w="2478657">
+                  <a:extLst>
+                    <a:ext uri="{9D8B030D-6E8A-4147-A177-3AD203B41FA5}">
+                      <a16:colId xmlns:a16="http://schemas.microsoft.com/office/drawing/2014/main" val="1806089394"/>
+                    </a:ext>
+                  </a:extLst>
+                </a:gridCol>
+                <a:gridCol w="908650">
+                  <a:extLst>
+                    <a:ext uri="{9D8B030D-6E8A-4147-A177-3AD203B41FA5}">
+                      <a16:colId xmlns:a16="http://schemas.microsoft.com/office/drawing/2014/main" val="2597290812"/>
+                    </a:ext>
+                  </a:extLst>
+                </a:gridCol>
+              </a:tblGrid>
+              <a:tr h="370840">
+                <a:tc>
+                  <a:txBody>
+                    <a:bodyPr/>
+                    <a:lstStyle/>
+                    <a:p>
+                      <a:r>
+                        <a:rPr lang="de-CH" dirty="0" smtClean="0"/>
+                        <a:t>Vorzeichen</a:t>
+                      </a:r>
+                      <a:endParaRPr lang="en-GB" dirty="0"/>
+                    </a:p>
+                  </a:txBody>
+                  <a:tcPr/>
+                </a:tc>
+                <a:tc>
+                  <a:txBody>
+                    <a:bodyPr/>
+                    <a:lstStyle/>
+                    <a:p>
+                      <a:r>
+                        <a:rPr lang="de-CH" dirty="0" smtClean="0"/>
+                        <a:t>Ganzzahlteil</a:t>
+                      </a:r>
+                      <a:endParaRPr lang="en-GB" dirty="0"/>
+                    </a:p>
+                  </a:txBody>
+                  <a:tcPr/>
+                </a:tc>
+                <a:tc>
+                  <a:txBody>
+                    <a:bodyPr/>
+                    <a:lstStyle/>
+                    <a:p>
+                      <a:r>
+                        <a:rPr lang="de-CH" dirty="0" smtClean="0"/>
+                        <a:t>Trennzeichen</a:t>
+                      </a:r>
+                      <a:endParaRPr lang="en-GB" dirty="0"/>
+                    </a:p>
+                  </a:txBody>
+                  <a:tcPr/>
+                </a:tc>
+                <a:tc>
+                  <a:txBody>
+                    <a:bodyPr/>
+                    <a:lstStyle/>
+                    <a:p>
+                      <a:r>
+                        <a:rPr lang="de-CH" dirty="0" smtClean="0"/>
+                        <a:t>Nichtperiodische</a:t>
+                      </a:r>
+                      <a:r>
+                        <a:rPr lang="de-CH" baseline="0" dirty="0" smtClean="0"/>
+                        <a:t> Nachkommastellen</a:t>
+                      </a:r>
+                      <a:endParaRPr lang="en-GB" dirty="0"/>
+                    </a:p>
+                  </a:txBody>
+                  <a:tcPr/>
+                </a:tc>
+                <a:tc>
+                  <a:txBody>
+                    <a:bodyPr/>
+                    <a:lstStyle/>
+                    <a:p>
+                      <a:r>
+                        <a:rPr lang="de-CH" dirty="0" smtClean="0"/>
+                        <a:t>(</a:t>
+                      </a:r>
+                      <a:endParaRPr lang="en-GB" dirty="0"/>
+                    </a:p>
+                  </a:txBody>
+                  <a:tcPr/>
+                </a:tc>
+                <a:tc>
+                  <a:txBody>
+                    <a:bodyPr/>
+                    <a:lstStyle/>
+                    <a:p>
+                      <a:r>
+                        <a:rPr lang="de-CH" dirty="0" smtClean="0"/>
+                        <a:t>Periodische Nachkommastellen</a:t>
+                      </a:r>
+                      <a:endParaRPr lang="en-GB" dirty="0"/>
+                    </a:p>
+                  </a:txBody>
+                  <a:tcPr/>
+                </a:tc>
+                <a:tc>
+                  <a:txBody>
+                    <a:bodyPr/>
+                    <a:lstStyle/>
+                    <a:p>
+                      <a:r>
+                        <a:rPr lang="de-CH" dirty="0" smtClean="0"/>
+                        <a:t>)</a:t>
+                      </a:r>
+                      <a:endParaRPr lang="en-GB" dirty="0"/>
+                    </a:p>
+                  </a:txBody>
+                  <a:tcPr/>
+                </a:tc>
+                <a:extLst>
+                  <a:ext uri="{0D108BD9-81ED-4DB2-BD59-A6C34878D82A}">
+                    <a16:rowId xmlns:a16="http://schemas.microsoft.com/office/drawing/2014/main" val="1571211460"/>
+                  </a:ext>
+                </a:extLst>
+              </a:tr>
+              <a:tr h="370840">
+                <a:tc>
+                  <a:txBody>
+                    <a:bodyPr/>
+                    <a:lstStyle/>
+                    <a:p>
+                      <a:r>
+                        <a:rPr lang="de-CH" dirty="0" smtClean="0"/>
+                        <a:t>-</a:t>
+                      </a:r>
+                      <a:endParaRPr lang="en-GB" dirty="0"/>
+                    </a:p>
+                  </a:txBody>
+                  <a:tcPr/>
+                </a:tc>
+                <a:tc>
+                  <a:txBody>
+                    <a:bodyPr/>
+                    <a:lstStyle/>
+                    <a:p>
+                      <a:r>
+                        <a:rPr lang="de-CH" dirty="0" smtClean="0"/>
+                        <a:t>1</a:t>
+                      </a:r>
+                      <a:endParaRPr lang="en-GB" dirty="0"/>
+                    </a:p>
+                  </a:txBody>
+                  <a:tcPr/>
+                </a:tc>
+                <a:tc>
+                  <a:txBody>
+                    <a:bodyPr/>
+                    <a:lstStyle/>
+                    <a:p>
+                      <a:r>
+                        <a:rPr lang="de-CH" dirty="0" smtClean="0"/>
+                        <a:t>.</a:t>
+                      </a:r>
+                      <a:endParaRPr lang="en-GB" dirty="0"/>
+                    </a:p>
+                  </a:txBody>
+                  <a:tcPr/>
+                </a:tc>
+                <a:tc>
+                  <a:txBody>
+                    <a:bodyPr/>
+                    <a:lstStyle/>
+                    <a:p>
+                      <a:r>
+                        <a:rPr lang="de-CH" dirty="0" smtClean="0"/>
+                        <a:t>003</a:t>
+                      </a:r>
+                      <a:endParaRPr lang="en-GB" dirty="0"/>
+                    </a:p>
+                  </a:txBody>
+                  <a:tcPr/>
+                </a:tc>
+                <a:tc>
+                  <a:txBody>
+                    <a:bodyPr/>
+                    <a:lstStyle/>
+                    <a:p>
+                      <a:r>
+                        <a:rPr lang="de-CH" dirty="0" smtClean="0"/>
+                        <a:t>(</a:t>
+                      </a:r>
+                      <a:endParaRPr lang="en-GB" dirty="0"/>
+                    </a:p>
+                  </a:txBody>
+                  <a:tcPr/>
+                </a:tc>
+                <a:tc>
+                  <a:txBody>
+                    <a:bodyPr/>
+                    <a:lstStyle/>
+                    <a:p>
+                      <a:r>
+                        <a:rPr lang="de-CH" dirty="0" smtClean="0"/>
+                        <a:t>571428</a:t>
+                      </a:r>
+                      <a:endParaRPr lang="en-GB" dirty="0"/>
+                    </a:p>
+                  </a:txBody>
+                  <a:tcPr/>
+                </a:tc>
+                <a:tc>
+                  <a:txBody>
+                    <a:bodyPr/>
+                    <a:lstStyle/>
+                    <a:p>
+                      <a:r>
+                        <a:rPr lang="de-CH" dirty="0" smtClean="0"/>
+                        <a:t>)</a:t>
+                      </a:r>
+                      <a:endParaRPr lang="en-GB" dirty="0"/>
+                    </a:p>
+                  </a:txBody>
+                  <a:tcPr/>
+                </a:tc>
+                <a:extLst>
+                  <a:ext uri="{0D108BD9-81ED-4DB2-BD59-A6C34878D82A}">
+                    <a16:rowId xmlns:a16="http://schemas.microsoft.com/office/drawing/2014/main" val="3714758531"/>
+                  </a:ext>
+                </a:extLst>
+              </a:tr>
+            </a:tbl>
+          </a:graphicData>
+        </a:graphic>
+      </p:graphicFrame>
     </p:spTree>
     <p:extLst>
       <p:ext uri="{BB962C8B-B14F-4D97-AF65-F5344CB8AC3E}">
-        <p14:creationId xmlns:p14="http://schemas.microsoft.com/office/powerpoint/2010/main" val="160556983"/>
+        <p14:creationId xmlns:p14="http://schemas.microsoft.com/office/powerpoint/2010/main" val="3486482547"/>
       </p:ext>
     </p:extLst>
   </p:cSld>

</xml_diff>

<commit_message>
divtrun nach div angepasst
</commit_message>
<xml_diff>
--- a/docs/Präsentation_Schlussbericht.pptx
+++ b/docs/Präsentation_Schlussbericht.pptx
@@ -233,7 +233,7 @@
           <a:p>
             <a:fld id="{68796EA6-6F25-4F19-87BA-7ADCC16DAEFF}" type="datetimeFigureOut">
               <a:rPr lang="en-US" smtClean="0"/>
-              <a:t>1/11/2016</a:t>
+              <a:t>1/12/2016</a:t>
             </a:fld>
             <a:endParaRPr lang="en-US" dirty="0"/>
           </a:p>
@@ -398,7 +398,7 @@
           <a:p>
             <a:fld id="{C39C172E-A8B5-46F6-B05C-DFA3E2E0F207}" type="datetimeFigureOut">
               <a:rPr lang="en-US" smtClean="0"/>
-              <a:t>1/11/2016</a:t>
+              <a:t>1/12/2016</a:t>
             </a:fld>
             <a:endParaRPr lang="en-US" dirty="0"/>
           </a:p>
@@ -1635,7 +1635,7 @@
           <a:p>
             <a:fld id="{4E708F12-96AD-4ED4-8132-A78F5E42C1F5}" type="datetime1">
               <a:rPr lang="en-US" smtClean="0"/>
-              <a:t>1/11/2016</a:t>
+              <a:t>1/12/2016</a:t>
             </a:fld>
             <a:endParaRPr lang="en-US" dirty="0"/>
           </a:p>
@@ -1857,7 +1857,7 @@
           <a:p>
             <a:fld id="{7B7FA170-8299-44AD-AEEF-FC686C3D7804}" type="datetime1">
               <a:rPr lang="en-US" smtClean="0"/>
-              <a:t>1/11/2016</a:t>
+              <a:t>1/12/2016</a:t>
             </a:fld>
             <a:endParaRPr lang="en-US" dirty="0"/>
           </a:p>
@@ -2039,7 +2039,7 @@
           <a:p>
             <a:fld id="{2231763A-68EC-4ECD-9620-D9FE9CDDD622}" type="datetime1">
               <a:rPr lang="en-US" smtClean="0"/>
-              <a:t>1/11/2016</a:t>
+              <a:t>1/12/2016</a:t>
             </a:fld>
             <a:endParaRPr lang="en-US" dirty="0"/>
           </a:p>
@@ -2231,7 +2231,7 @@
           <a:p>
             <a:fld id="{7B98BEDD-6160-49BB-B372-861DE7DE9BA5}" type="datetime1">
               <a:rPr lang="en-US" smtClean="0"/>
-              <a:t>1/11/2016</a:t>
+              <a:t>1/12/2016</a:t>
             </a:fld>
             <a:endParaRPr lang="en-US" dirty="0"/>
           </a:p>
@@ -2413,7 +2413,7 @@
           <a:p>
             <a:fld id="{0AAE819F-B7FD-4B29-8F66-9E318144BC2A}" type="datetime1">
               <a:rPr lang="en-US" smtClean="0"/>
-              <a:t>1/11/2016</a:t>
+              <a:t>1/12/2016</a:t>
             </a:fld>
             <a:endParaRPr lang="en-US" dirty="0"/>
           </a:p>
@@ -2645,7 +2645,7 @@
           <a:p>
             <a:fld id="{D4CA159C-B6E0-4F10-9F4A-2FA57003B139}" type="datetime1">
               <a:rPr lang="en-US" smtClean="0"/>
-              <a:t>1/11/2016</a:t>
+              <a:t>1/12/2016</a:t>
             </a:fld>
             <a:endParaRPr lang="en-US" dirty="0"/>
           </a:p>
@@ -2937,7 +2937,7 @@
           <a:p>
             <a:fld id="{8170CBBB-D1D1-4386-A5E9-07F3477B78F3}" type="datetime1">
               <a:rPr lang="en-US" smtClean="0"/>
-              <a:t>1/11/2016</a:t>
+              <a:t>1/12/2016</a:t>
             </a:fld>
             <a:endParaRPr lang="en-US" dirty="0"/>
           </a:p>
@@ -3365,7 +3365,7 @@
           <a:p>
             <a:fld id="{9FA4CAD8-0EA7-4615-B69B-B2F199EF3A93}" type="datetime1">
               <a:rPr lang="en-US" smtClean="0"/>
-              <a:t>1/11/2016</a:t>
+              <a:t>1/12/2016</a:t>
             </a:fld>
             <a:endParaRPr lang="en-US" dirty="0"/>
           </a:p>
@@ -3518,7 +3518,7 @@
           <a:p>
             <a:fld id="{B9234BD7-6953-492C-921B-E68B2D7F14C8}" type="datetime1">
               <a:rPr lang="en-US" smtClean="0"/>
-              <a:t>1/11/2016</a:t>
+              <a:t>1/12/2016</a:t>
             </a:fld>
             <a:endParaRPr lang="en-US" dirty="0"/>
           </a:p>
@@ -3625,7 +3625,7 @@
           <a:p>
             <a:fld id="{35A17D9B-D4D3-4E23-88DF-2E354FA43196}" type="datetime1">
               <a:rPr lang="en-US" smtClean="0"/>
-              <a:t>1/11/2016</a:t>
+              <a:t>1/12/2016</a:t>
             </a:fld>
             <a:endParaRPr lang="en-US" dirty="0"/>
           </a:p>
@@ -3887,7 +3887,7 @@
           <a:p>
             <a:fld id="{541F67C5-D04E-4576-B61C-12ABA14BBD6C}" type="datetime1">
               <a:rPr lang="en-US" smtClean="0"/>
-              <a:t>1/11/2016</a:t>
+              <a:t>1/12/2016</a:t>
             </a:fld>
             <a:endParaRPr lang="en-US" dirty="0"/>
           </a:p>
@@ -4787,7 +4787,7 @@
           <a:p>
             <a:fld id="{C20F09E4-6EA4-4BF3-9FC8-FF40373B88E6}" type="datetime1">
               <a:rPr lang="en-US" smtClean="0"/>
-              <a:t>1/11/2016</a:t>
+              <a:t>1/12/2016</a:t>
             </a:fld>
             <a:endParaRPr lang="en-US" dirty="0"/>
           </a:p>
@@ -7091,7 +7091,7 @@
             </a:r>
             <a:r>
               <a:rPr lang="en-GB" dirty="0" err="1" smtClean="0"/>
-              <a:t>DivTruncRatio</a:t>
+              <a:t>DivRatio</a:t>
             </a:r>
             <a:endParaRPr lang="en-GB" dirty="0" smtClean="0"/>
           </a:p>

</xml_diff>

<commit_message>
Incr stack size, ackermann function, presentation
</commit_message>
<xml_diff>
--- a/docs/Präsentation_Schlussbericht.pptx
+++ b/docs/Präsentation_Schlussbericht.pptx
@@ -5,10 +5,10 @@
     <p:sldMasterId id="2147483696" r:id="rId2"/>
   </p:sldMasterIdLst>
   <p:notesMasterIdLst>
-    <p:notesMasterId r:id="rId13"/>
+    <p:notesMasterId r:id="rId16"/>
   </p:notesMasterIdLst>
   <p:handoutMasterIdLst>
-    <p:handoutMasterId r:id="rId14"/>
+    <p:handoutMasterId r:id="rId17"/>
   </p:handoutMasterIdLst>
   <p:sldIdLst>
     <p:sldId id="257" r:id="rId3"/>
@@ -17,10 +17,13 @@
     <p:sldId id="264" r:id="rId6"/>
     <p:sldId id="260" r:id="rId7"/>
     <p:sldId id="262" r:id="rId8"/>
-    <p:sldId id="267" r:id="rId9"/>
-    <p:sldId id="266" r:id="rId10"/>
-    <p:sldId id="269" r:id="rId11"/>
-    <p:sldId id="268" r:id="rId12"/>
+    <p:sldId id="270" r:id="rId9"/>
+    <p:sldId id="271" r:id="rId10"/>
+    <p:sldId id="272" r:id="rId11"/>
+    <p:sldId id="267" r:id="rId12"/>
+    <p:sldId id="266" r:id="rId13"/>
+    <p:sldId id="269" r:id="rId14"/>
+    <p:sldId id="268" r:id="rId15"/>
   </p:sldIdLst>
   <p:sldSz cx="12192000" cy="6858000"/>
   <p:notesSz cx="6858000" cy="9144000"/>
@@ -5446,15 +5449,7 @@
           <a:p>
             <a:r>
               <a:rPr lang="en-GB" dirty="0" err="1" smtClean="0"/>
-              <a:t>Einlesen</a:t>
-            </a:r>
-            <a:r>
-              <a:rPr lang="en-GB" dirty="0" smtClean="0"/>
-              <a:t> der </a:t>
-            </a:r>
-            <a:r>
-              <a:rPr lang="en-GB" dirty="0" err="1" smtClean="0"/>
-              <a:t>erreichten</a:t>
+              <a:t>Neuer</a:t>
             </a:r>
             <a:r>
               <a:rPr lang="en-GB" dirty="0" smtClean="0"/>
@@ -5462,15 +5457,7 @@
             </a:r>
             <a:r>
               <a:rPr lang="en-GB" dirty="0" err="1" smtClean="0"/>
-              <a:t>Punktezahl</a:t>
-            </a:r>
-            <a:r>
-              <a:rPr lang="en-GB" dirty="0" smtClean="0"/>
-              <a:t> und der </a:t>
-            </a:r>
-            <a:r>
-              <a:rPr lang="en-GB" dirty="0" err="1" smtClean="0"/>
-              <a:t>maximalen</a:t>
+              <a:t>Datentyp</a:t>
             </a:r>
             <a:r>
               <a:rPr lang="en-GB" dirty="0" smtClean="0"/>
@@ -5478,48 +5465,15 @@
             </a:r>
             <a:r>
               <a:rPr lang="en-GB" dirty="0" err="1" smtClean="0"/>
-              <a:t>Punktezahl</a:t>
-            </a:r>
-            <a:endParaRPr lang="en-GB" dirty="0" smtClean="0"/>
-          </a:p>
-          <a:p>
-            <a:r>
-              <a:rPr lang="en-GB" dirty="0" err="1" smtClean="0"/>
-              <a:t>Notenberechnung</a:t>
-            </a:r>
-            <a:r>
-              <a:rPr lang="en-GB" dirty="0" smtClean="0"/>
-              <a:t> via </a:t>
-            </a:r>
-            <a:r>
-              <a:rPr lang="en-GB" dirty="0" err="1" smtClean="0"/>
-              <a:t>Standardformel</a:t>
-            </a:r>
-            <a:r>
-              <a:rPr lang="en-GB" dirty="0" smtClean="0"/>
-              <a:t>:</a:t>
-            </a:r>
-            <a:br>
-              <a:rPr lang="en-GB" dirty="0" smtClean="0"/>
-            </a:br>
-            <a:r>
-              <a:rPr lang="en-GB" dirty="0" smtClean="0"/>
-              <a:t/>
-            </a:r>
-            <a:br>
-              <a:rPr lang="en-GB" dirty="0" smtClean="0"/>
-            </a:br>
-            <a:r>
-              <a:rPr lang="en-GB" dirty="0" smtClean="0"/>
-              <a:t>Note := </a:t>
-            </a:r>
-            <a:r>
-              <a:rPr lang="en-GB" dirty="0" smtClean="0"/>
-              <a:t>(</a:t>
-            </a:r>
-            <a:r>
-              <a:rPr lang="en-GB" dirty="0" err="1" smtClean="0"/>
-              <a:t>asRatio</a:t>
+              <a:t>RatioData</a:t>
+            </a:r>
+            <a:r>
+              <a:rPr lang="en-GB" dirty="0" smtClean="0"/>
+              <a:t> (</a:t>
+            </a:r>
+            <a:r>
+              <a:rPr lang="en-GB" dirty="0" err="1" smtClean="0"/>
+              <a:t>wie</a:t>
             </a:r>
             <a:r>
               <a:rPr lang="en-GB" dirty="0" smtClean="0"/>
@@ -5527,40 +5481,33 @@
             </a:r>
             <a:r>
               <a:rPr lang="en-GB" dirty="0" err="1" smtClean="0"/>
-              <a:t>Punkte</a:t>
-            </a:r>
-            <a:r>
-              <a:rPr lang="en-GB" dirty="0" smtClean="0"/>
-              <a:t>) </a:t>
-            </a:r>
-            <a:r>
-              <a:rPr lang="en-GB" dirty="0" smtClean="0"/>
-              <a:t>* 5 / </a:t>
-            </a:r>
-            <a:r>
-              <a:rPr lang="en-GB" dirty="0" err="1" smtClean="0"/>
-              <a:t>MaximalPunkte</a:t>
+              <a:t>IntData</a:t>
+            </a:r>
+            <a:r>
+              <a:rPr lang="en-GB" dirty="0" smtClean="0"/>
+              <a:t>, </a:t>
+            </a:r>
+            <a:r>
+              <a:rPr lang="en-GB" dirty="0" err="1" smtClean="0"/>
+              <a:t>BoolData</a:t>
+            </a:r>
+            <a:r>
+              <a:rPr lang="en-GB" dirty="0" smtClean="0"/>
+              <a:t>)</a:t>
+            </a:r>
+          </a:p>
+          <a:p>
+            <a:r>
+              <a:rPr lang="en-GB" dirty="0" err="1" smtClean="0"/>
+              <a:t>Gibt</a:t>
             </a:r>
             <a:r>
               <a:rPr lang="en-GB" dirty="0" smtClean="0"/>
               <a:t> </a:t>
             </a:r>
-          </a:p>
-          <a:p>
-            <a:endParaRPr lang="en-GB" dirty="0"/>
-          </a:p>
-          <a:p>
-            <a:r>
-              <a:rPr lang="en-GB" dirty="0" err="1" smtClean="0"/>
-              <a:t>Rundung</a:t>
-            </a:r>
-            <a:r>
-              <a:rPr lang="en-GB" dirty="0" smtClean="0"/>
-              <a:t> auf </a:t>
-            </a:r>
-            <a:r>
-              <a:rPr lang="en-GB" dirty="0" err="1" smtClean="0"/>
-              <a:t>Zehntel</a:t>
+            <a:r>
+              <a:rPr lang="en-GB" dirty="0" err="1" smtClean="0"/>
+              <a:t>immer</a:t>
             </a:r>
             <a:r>
               <a:rPr lang="en-GB" dirty="0" smtClean="0"/>
@@ -5568,1356 +5515,11 @@
             </a:r>
             <a:r>
               <a:rPr lang="en-GB" dirty="0" err="1" smtClean="0"/>
-              <a:t>mit</a:t>
-            </a:r>
-            <a:r>
-              <a:rPr lang="en-GB" dirty="0" smtClean="0"/>
-              <a:t>:</a:t>
-            </a:r>
-            <a:br>
-              <a:rPr lang="en-GB" dirty="0" smtClean="0"/>
-            </a:br>
-            <a:r>
-              <a:rPr lang="en-GB" dirty="0" smtClean="0"/>
-              <a:t/>
-            </a:r>
-            <a:br>
-              <a:rPr lang="en-GB" dirty="0" smtClean="0"/>
-            </a:br>
-            <a:r>
-              <a:rPr lang="en-GB" dirty="0" smtClean="0"/>
-              <a:t>Note := (round (Note * 10)) / </a:t>
-            </a:r>
-            <a:r>
-              <a:rPr lang="en-GB" dirty="0" smtClean="0"/>
-              <a:t>(</a:t>
-            </a:r>
-            <a:r>
-              <a:rPr lang="en-GB" dirty="0" err="1" smtClean="0"/>
-              <a:t>asRatio</a:t>
-            </a:r>
-            <a:r>
-              <a:rPr lang="en-GB" dirty="0" smtClean="0"/>
-              <a:t> 10)</a:t>
-            </a:r>
-            <a:endParaRPr lang="en-GB" dirty="0" smtClean="0"/>
-          </a:p>
-        </p:txBody>
-      </p:sp>
-      <p:sp>
-        <p:nvSpPr>
-          <p:cNvPr id="3" name="Title 2"/>
-          <p:cNvSpPr>
-            <a:spLocks noGrp="1"/>
-          </p:cNvSpPr>
-          <p:nvPr>
-            <p:ph type="title"/>
-          </p:nvPr>
-        </p:nvSpPr>
-        <p:spPr/>
-        <p:txBody>
-          <a:bodyPr/>
-          <a:lstStyle/>
-          <a:p>
-            <a:r>
-              <a:rPr lang="en-GB" dirty="0" smtClean="0"/>
-              <a:t>Demo</a:t>
-            </a:r>
-            <a:endParaRPr lang="en-GB" dirty="0"/>
-          </a:p>
-        </p:txBody>
-      </p:sp>
-    </p:spTree>
-    <p:extLst>
-      <p:ext uri="{BB962C8B-B14F-4D97-AF65-F5344CB8AC3E}">
-        <p14:creationId xmlns:p14="http://schemas.microsoft.com/office/powerpoint/2010/main" val="749255209"/>
-      </p:ext>
-    </p:extLst>
-  </p:cSld>
-  <p:clrMapOvr>
-    <a:masterClrMapping/>
-  </p:clrMapOvr>
-  <mc:AlternateContent xmlns:mc="http://schemas.openxmlformats.org/markup-compatibility/2006" xmlns:p14="http://schemas.microsoft.com/office/powerpoint/2010/main">
-    <mc:Choice Requires="p14">
-      <p:transition spd="med" p14:dur="700">
-        <p:fade/>
-      </p:transition>
-    </mc:Choice>
-    <mc:Fallback xmlns="">
-      <p:transition spd="med">
-        <p:fade/>
-      </p:transition>
-    </mc:Fallback>
-  </mc:AlternateContent>
-</p:sld>
-</file>
-
-<file path=ppt/slides/slide2.xml><?xml version="1.0" encoding="utf-8"?>
-<p:sld xmlns:a="http://schemas.openxmlformats.org/drawingml/2006/main" xmlns:r="http://schemas.openxmlformats.org/officeDocument/2006/relationships" xmlns:p="http://schemas.openxmlformats.org/presentationml/2006/main">
-  <p:cSld>
-    <p:spTree>
-      <p:nvGrpSpPr>
-        <p:cNvPr id="1" name=""/>
-        <p:cNvGrpSpPr/>
-        <p:nvPr/>
-      </p:nvGrpSpPr>
-      <p:grpSpPr>
-        <a:xfrm>
-          <a:off x="0" y="0"/>
-          <a:ext cx="0" cy="0"/>
-          <a:chOff x="0" y="0"/>
-          <a:chExt cx="0" cy="0"/>
-        </a:xfrm>
-      </p:grpSpPr>
-      <p:sp>
-        <p:nvSpPr>
-          <p:cNvPr id="3" name="Content Placeholder 2"/>
-          <p:cNvSpPr>
-            <a:spLocks noGrp="1"/>
-          </p:cNvSpPr>
-          <p:nvPr>
-            <p:ph idx="1"/>
-          </p:nvPr>
-        </p:nvSpPr>
-        <p:spPr/>
-        <p:txBody>
-          <a:bodyPr/>
-          <a:lstStyle/>
-          <a:p>
-            <a:r>
-              <a:rPr lang="en-US" dirty="0" err="1" smtClean="0"/>
-              <a:t>Einführung</a:t>
-            </a:r>
-            <a:r>
-              <a:rPr lang="en-US" dirty="0" smtClean="0"/>
-              <a:t> </a:t>
-            </a:r>
-            <a:r>
-              <a:rPr lang="en-US" dirty="0" err="1" smtClean="0"/>
-              <a:t>eines</a:t>
-            </a:r>
-            <a:r>
-              <a:rPr lang="en-US" dirty="0" smtClean="0"/>
-              <a:t> </a:t>
-            </a:r>
-            <a:r>
-              <a:rPr lang="en-US" dirty="0" err="1" smtClean="0"/>
-              <a:t>neuen</a:t>
-            </a:r>
-            <a:r>
-              <a:rPr lang="en-US" dirty="0" smtClean="0"/>
-              <a:t> </a:t>
-            </a:r>
-            <a:r>
-              <a:rPr lang="en-US" dirty="0" err="1" smtClean="0"/>
-              <a:t>Datentyps</a:t>
-            </a:r>
-            <a:r>
-              <a:rPr lang="en-US" dirty="0" smtClean="0"/>
-              <a:t> </a:t>
-            </a:r>
-            <a:r>
-              <a:rPr lang="en-US" i="1" dirty="0" smtClean="0"/>
-              <a:t>RATIO</a:t>
-            </a:r>
-            <a:endParaRPr lang="en-US" dirty="0" smtClean="0"/>
-          </a:p>
-          <a:p>
-            <a:r>
-              <a:rPr lang="en-US" dirty="0" err="1" smtClean="0"/>
-              <a:t>Darstellung</a:t>
-            </a:r>
-            <a:r>
-              <a:rPr lang="en-US" dirty="0" smtClean="0"/>
-              <a:t> </a:t>
-            </a:r>
-            <a:r>
-              <a:rPr lang="en-US" dirty="0" err="1" smtClean="0"/>
-              <a:t>als</a:t>
-            </a:r>
-            <a:r>
-              <a:rPr lang="en-US" dirty="0" smtClean="0"/>
-              <a:t> </a:t>
-            </a:r>
-            <a:r>
-              <a:rPr lang="en-US" dirty="0" err="1" smtClean="0"/>
-              <a:t>Brüche</a:t>
-            </a:r>
-            <a:r>
-              <a:rPr lang="en-US" dirty="0" smtClean="0"/>
-              <a:t> </a:t>
-            </a:r>
-            <a:r>
-              <a:rPr lang="en-US" dirty="0" err="1" smtClean="0"/>
-              <a:t>mit</a:t>
-            </a:r>
-            <a:r>
-              <a:rPr lang="en-US" dirty="0" smtClean="0"/>
-              <a:t> </a:t>
-            </a:r>
-            <a:r>
-              <a:rPr lang="en-US" dirty="0" err="1" smtClean="0"/>
-              <a:t>Zähler</a:t>
-            </a:r>
-            <a:r>
-              <a:rPr lang="en-US" dirty="0" smtClean="0"/>
-              <a:t> und </a:t>
-            </a:r>
-            <a:r>
-              <a:rPr lang="en-US" dirty="0" err="1" smtClean="0"/>
-              <a:t>Nenner</a:t>
-            </a:r>
-            <a:endParaRPr lang="en-US" dirty="0" smtClean="0"/>
-          </a:p>
-          <a:p>
-            <a:r>
-              <a:rPr lang="en-US" dirty="0" err="1" smtClean="0"/>
-              <a:t>Zur</a:t>
-            </a:r>
-            <a:r>
-              <a:rPr lang="en-US" dirty="0" smtClean="0"/>
-              <a:t> </a:t>
-            </a:r>
-            <a:r>
-              <a:rPr lang="en-US" dirty="0" err="1" smtClean="0"/>
-              <a:t>Laufzeit</a:t>
-            </a:r>
-            <a:r>
-              <a:rPr lang="en-US" dirty="0" smtClean="0"/>
-              <a:t> </a:t>
-            </a:r>
-            <a:r>
-              <a:rPr lang="en-US" dirty="0" err="1" smtClean="0"/>
-              <a:t>wird</a:t>
-            </a:r>
-            <a:r>
-              <a:rPr lang="en-US" dirty="0" smtClean="0"/>
-              <a:t> </a:t>
-            </a:r>
-            <a:r>
-              <a:rPr lang="en-US" dirty="0" err="1" smtClean="0"/>
-              <a:t>gekürzt</a:t>
-            </a:r>
-            <a:r>
-              <a:rPr lang="en-US" dirty="0" smtClean="0"/>
-              <a:t>, so </a:t>
-            </a:r>
-            <a:r>
-              <a:rPr lang="en-US" dirty="0" err="1" smtClean="0"/>
-              <a:t>dass</a:t>
-            </a:r>
-            <a:r>
-              <a:rPr lang="en-US" dirty="0" smtClean="0"/>
-              <a:t> </a:t>
-            </a:r>
-            <a:r>
-              <a:rPr lang="en-US" dirty="0" err="1" smtClean="0"/>
-              <a:t>Zähler</a:t>
-            </a:r>
-            <a:r>
-              <a:rPr lang="en-US" dirty="0" smtClean="0"/>
-              <a:t> und </a:t>
-            </a:r>
-            <a:r>
-              <a:rPr lang="en-US" dirty="0" err="1" smtClean="0"/>
-              <a:t>Nenner</a:t>
-            </a:r>
-            <a:r>
-              <a:rPr lang="en-US" dirty="0" smtClean="0"/>
-              <a:t> </a:t>
-            </a:r>
-            <a:r>
-              <a:rPr lang="en-US" dirty="0" err="1" smtClean="0"/>
-              <a:t>keine</a:t>
-            </a:r>
-            <a:r>
-              <a:rPr lang="en-US" dirty="0" smtClean="0"/>
-              <a:t> </a:t>
-            </a:r>
-            <a:r>
-              <a:rPr lang="en-US" dirty="0" err="1" smtClean="0"/>
-              <a:t>gemeinsamen</a:t>
-            </a:r>
-            <a:r>
-              <a:rPr lang="en-US" dirty="0" smtClean="0"/>
-              <a:t> </a:t>
-            </a:r>
-            <a:r>
-              <a:rPr lang="en-US" dirty="0" err="1" smtClean="0"/>
-              <a:t>Teiler</a:t>
-            </a:r>
-            <a:r>
-              <a:rPr lang="en-US" dirty="0" smtClean="0"/>
-              <a:t> </a:t>
-            </a:r>
-            <a:r>
-              <a:rPr lang="en-US" dirty="0" err="1" smtClean="0"/>
-              <a:t>ausser</a:t>
-            </a:r>
-            <a:r>
-              <a:rPr lang="en-US" dirty="0" smtClean="0"/>
-              <a:t> 1 </a:t>
-            </a:r>
-            <a:r>
-              <a:rPr lang="en-US" dirty="0" err="1" smtClean="0"/>
-              <a:t>besitzen</a:t>
-            </a:r>
-            <a:r>
-              <a:rPr lang="en-US" dirty="0" smtClean="0"/>
-              <a:t>.</a:t>
-            </a:r>
-          </a:p>
-          <a:p>
-            <a:endParaRPr lang="en-US" dirty="0"/>
-          </a:p>
-        </p:txBody>
-      </p:sp>
-      <p:sp>
-        <p:nvSpPr>
-          <p:cNvPr id="2" name="Title 1"/>
-          <p:cNvSpPr>
-            <a:spLocks noGrp="1"/>
-          </p:cNvSpPr>
-          <p:nvPr>
-            <p:ph type="title"/>
-          </p:nvPr>
-        </p:nvSpPr>
-        <p:spPr/>
-        <p:txBody>
-          <a:bodyPr>
-            <a:normAutofit/>
-          </a:bodyPr>
-          <a:lstStyle/>
-          <a:p>
-            <a:r>
-              <a:rPr lang="en-US" dirty="0" err="1" smtClean="0"/>
-              <a:t>Idee</a:t>
-            </a:r>
-            <a:endParaRPr lang="en-US" dirty="0"/>
-          </a:p>
-        </p:txBody>
-      </p:sp>
-    </p:spTree>
-    <p:extLst>
-      <p:ext uri="{BB962C8B-B14F-4D97-AF65-F5344CB8AC3E}">
-        <p14:creationId xmlns:p14="http://schemas.microsoft.com/office/powerpoint/2010/main" val="1851896080"/>
-      </p:ext>
-    </p:extLst>
-  </p:cSld>
-  <p:clrMapOvr>
-    <a:masterClrMapping/>
-  </p:clrMapOvr>
-  <mc:AlternateContent xmlns:mc="http://schemas.openxmlformats.org/markup-compatibility/2006" xmlns:p14="http://schemas.microsoft.com/office/powerpoint/2010/main">
-    <mc:Choice Requires="p14">
-      <p:transition spd="med" p14:dur="700">
-        <p:fade/>
-      </p:transition>
-    </mc:Choice>
-    <mc:Fallback xmlns="">
-      <p:transition spd="med">
-        <p:fade/>
-      </p:transition>
-    </mc:Fallback>
-  </mc:AlternateContent>
-</p:sld>
-</file>
-
-<file path=ppt/slides/slide3.xml><?xml version="1.0" encoding="utf-8"?>
-<p:sld xmlns:a="http://schemas.openxmlformats.org/drawingml/2006/main" xmlns:r="http://schemas.openxmlformats.org/officeDocument/2006/relationships" xmlns:p="http://schemas.openxmlformats.org/presentationml/2006/main">
-  <p:cSld>
-    <p:spTree>
-      <p:nvGrpSpPr>
-        <p:cNvPr id="1" name=""/>
-        <p:cNvGrpSpPr/>
-        <p:nvPr/>
-      </p:nvGrpSpPr>
-      <p:grpSpPr>
-        <a:xfrm>
-          <a:off x="0" y="0"/>
-          <a:ext cx="0" cy="0"/>
-          <a:chOff x="0" y="0"/>
-          <a:chExt cx="0" cy="0"/>
-        </a:xfrm>
-      </p:grpSpPr>
-      <p:sp>
-        <p:nvSpPr>
-          <p:cNvPr id="3" name="Content Placeholder 2"/>
-          <p:cNvSpPr>
-            <a:spLocks noGrp="1"/>
-          </p:cNvSpPr>
-          <p:nvPr>
-            <p:ph idx="1"/>
-          </p:nvPr>
-        </p:nvSpPr>
-        <p:spPr/>
-        <p:txBody>
-          <a:bodyPr/>
-          <a:lstStyle/>
-          <a:p>
-            <a:r>
-              <a:rPr lang="en-US" dirty="0" smtClean="0"/>
-              <a:t>Pattern</a:t>
-            </a:r>
-          </a:p>
-          <a:p>
-            <a:pPr marL="411480" lvl="1" indent="0">
-              <a:buNone/>
-            </a:pPr>
-            <a:r>
-              <a:rPr lang="en-GB" dirty="0">
-                <a:latin typeface="Consolas" panose="020B0609020204030204" pitchFamily="49" charset="0"/>
-                <a:cs typeface="Consolas" panose="020B0609020204030204" pitchFamily="49" charset="0"/>
-              </a:rPr>
-              <a:t>[0-9]+(‘*[0-9]+)*/[1-9]+(‘*[0-9</a:t>
-            </a:r>
-            <a:r>
-              <a:rPr lang="en-GB" dirty="0" smtClean="0">
-                <a:latin typeface="Consolas" panose="020B0609020204030204" pitchFamily="49" charset="0"/>
-                <a:cs typeface="Consolas" panose="020B0609020204030204" pitchFamily="49" charset="0"/>
-              </a:rPr>
-              <a:t>]+)*</a:t>
-            </a:r>
-          </a:p>
-          <a:p>
-            <a:pPr marL="411480" lvl="1" indent="0">
-              <a:buNone/>
-            </a:pPr>
-            <a:endParaRPr lang="en-GB" dirty="0">
-              <a:latin typeface="Consolas" panose="020B0609020204030204" pitchFamily="49" charset="0"/>
-              <a:cs typeface="Consolas" panose="020B0609020204030204" pitchFamily="49" charset="0"/>
-            </a:endParaRPr>
-          </a:p>
-          <a:p>
-            <a:r>
-              <a:rPr lang="en-GB" dirty="0"/>
-              <a:t>Lexeme</a:t>
-            </a:r>
-          </a:p>
-          <a:p>
-            <a:pPr marL="411480" lvl="1" indent="0">
-              <a:buNone/>
-            </a:pPr>
-            <a:r>
-              <a:rPr lang="en-GB" dirty="0" smtClean="0">
-                <a:latin typeface="Consolas" panose="020B0609020204030204" pitchFamily="49" charset="0"/>
-                <a:cs typeface="Consolas" panose="020B0609020204030204" pitchFamily="49" charset="0"/>
-              </a:rPr>
-              <a:t>1’337/42  -&gt; 191 / 6</a:t>
-            </a:r>
-          </a:p>
-          <a:p>
-            <a:pPr marL="411480" lvl="1" indent="0">
-              <a:buNone/>
-            </a:pPr>
-            <a:endParaRPr lang="en-GB" dirty="0" smtClean="0">
-              <a:latin typeface="Consolas" panose="020B0609020204030204" pitchFamily="49" charset="0"/>
-              <a:cs typeface="Consolas" panose="020B0609020204030204" pitchFamily="49" charset="0"/>
-            </a:endParaRPr>
-          </a:p>
-          <a:p>
-            <a:r>
-              <a:rPr lang="en-GB" dirty="0" err="1"/>
-              <a:t>Neues</a:t>
-            </a:r>
-            <a:r>
-              <a:rPr lang="en-GB" dirty="0"/>
-              <a:t> </a:t>
-            </a:r>
-            <a:r>
-              <a:rPr lang="en-GB" dirty="0" err="1"/>
-              <a:t>Attribut</a:t>
-            </a:r>
-            <a:r>
-              <a:rPr lang="en-GB" dirty="0"/>
-              <a:t> </a:t>
-            </a:r>
-            <a:r>
-              <a:rPr lang="en-GB" dirty="0" err="1"/>
-              <a:t>für</a:t>
-            </a:r>
-            <a:r>
-              <a:rPr lang="en-GB" dirty="0"/>
-              <a:t> </a:t>
-            </a:r>
-            <a:r>
-              <a:rPr lang="en-GB" dirty="0" smtClean="0"/>
-              <a:t>LITERAL-Token: </a:t>
-            </a:r>
-            <a:r>
-              <a:rPr lang="en-GB" dirty="0" err="1"/>
-              <a:t>RatioVal</a:t>
-            </a:r>
-            <a:r>
-              <a:rPr lang="en-GB" dirty="0"/>
-              <a:t> </a:t>
-            </a:r>
-            <a:r>
-              <a:rPr lang="en-GB" dirty="0" err="1" smtClean="0"/>
-              <a:t>Int</a:t>
-            </a:r>
-            <a:r>
-              <a:rPr lang="en-GB" dirty="0" smtClean="0"/>
-              <a:t> </a:t>
-            </a:r>
-            <a:r>
-              <a:rPr lang="en-GB" dirty="0" err="1" smtClean="0"/>
-              <a:t>Int</a:t>
-            </a:r>
-            <a:r>
-              <a:rPr lang="en-GB" dirty="0"/>
-              <a:t/>
-            </a:r>
-            <a:br>
-              <a:rPr lang="en-GB" dirty="0"/>
-            </a:br>
-            <a:endParaRPr lang="en-US" dirty="0"/>
-          </a:p>
-        </p:txBody>
-      </p:sp>
-      <p:sp>
-        <p:nvSpPr>
-          <p:cNvPr id="2" name="Title 1"/>
-          <p:cNvSpPr>
-            <a:spLocks noGrp="1"/>
-          </p:cNvSpPr>
-          <p:nvPr>
-            <p:ph type="title"/>
-          </p:nvPr>
-        </p:nvSpPr>
-        <p:spPr/>
-        <p:txBody>
-          <a:bodyPr/>
-          <a:lstStyle/>
-          <a:p>
-            <a:r>
-              <a:rPr lang="en-US" dirty="0" err="1" smtClean="0"/>
-              <a:t>Lexikalische</a:t>
-            </a:r>
-            <a:r>
-              <a:rPr lang="en-US" dirty="0" smtClean="0"/>
-              <a:t> Syntax</a:t>
-            </a:r>
-            <a:endParaRPr lang="en-US" dirty="0"/>
-          </a:p>
-        </p:txBody>
-      </p:sp>
-    </p:spTree>
-    <p:extLst>
-      <p:ext uri="{BB962C8B-B14F-4D97-AF65-F5344CB8AC3E}">
-        <p14:creationId xmlns:p14="http://schemas.microsoft.com/office/powerpoint/2010/main" val="997860157"/>
-      </p:ext>
-    </p:extLst>
-  </p:cSld>
-  <p:clrMapOvr>
-    <a:masterClrMapping/>
-  </p:clrMapOvr>
-  <mc:AlternateContent xmlns:mc="http://schemas.openxmlformats.org/markup-compatibility/2006" xmlns:p14="http://schemas.microsoft.com/office/powerpoint/2010/main">
-    <mc:Choice Requires="p14">
-      <p:transition spd="med" p14:dur="700">
-        <p:fade/>
-      </p:transition>
-    </mc:Choice>
-    <mc:Fallback xmlns="">
-      <p:transition spd="med">
-        <p:fade/>
-      </p:transition>
-    </mc:Fallback>
-  </mc:AlternateContent>
-</p:sld>
-</file>
-
-<file path=ppt/slides/slide4.xml><?xml version="1.0" encoding="utf-8"?>
-<p:sld xmlns:a="http://schemas.openxmlformats.org/drawingml/2006/main" xmlns:r="http://schemas.openxmlformats.org/officeDocument/2006/relationships" xmlns:p="http://schemas.openxmlformats.org/presentationml/2006/main">
-  <p:cSld>
-    <p:spTree>
-      <p:nvGrpSpPr>
-        <p:cNvPr id="1" name=""/>
-        <p:cNvGrpSpPr/>
-        <p:nvPr/>
-      </p:nvGrpSpPr>
-      <p:grpSpPr>
-        <a:xfrm>
-          <a:off x="0" y="0"/>
-          <a:ext cx="0" cy="0"/>
-          <a:chOff x="0" y="0"/>
-          <a:chExt cx="0" cy="0"/>
-        </a:xfrm>
-      </p:grpSpPr>
-      <p:sp>
-        <p:nvSpPr>
-          <p:cNvPr id="2" name="Content Placeholder 1"/>
-          <p:cNvSpPr>
-            <a:spLocks noGrp="1"/>
-          </p:cNvSpPr>
-          <p:nvPr>
-            <p:ph idx="1"/>
-          </p:nvPr>
-        </p:nvSpPr>
-        <p:spPr/>
-        <p:txBody>
-          <a:bodyPr/>
-          <a:lstStyle/>
-          <a:p>
-            <a:r>
-              <a:rPr lang="en-GB" dirty="0" err="1" smtClean="0"/>
-              <a:t>Neue</a:t>
-            </a:r>
-            <a:r>
-              <a:rPr lang="en-GB" dirty="0" smtClean="0"/>
-              <a:t> </a:t>
-            </a:r>
-            <a:r>
-              <a:rPr lang="en-GB" dirty="0" err="1" smtClean="0"/>
-              <a:t>Schlüsselwörter</a:t>
-            </a:r>
-            <a:endParaRPr lang="en-GB" dirty="0" smtClean="0"/>
-          </a:p>
-          <a:p>
-            <a:endParaRPr lang="en-GB" dirty="0"/>
-          </a:p>
-          <a:p>
-            <a:r>
-              <a:rPr lang="en-GB" dirty="0"/>
-              <a:t>r</a:t>
-            </a:r>
-            <a:r>
-              <a:rPr lang="en-GB" dirty="0" smtClean="0"/>
-              <a:t>atio: </a:t>
-            </a:r>
-            <a:r>
-              <a:rPr lang="en-GB" dirty="0" err="1" smtClean="0"/>
-              <a:t>Deklaration</a:t>
-            </a:r>
-            <a:endParaRPr lang="en-GB" dirty="0" smtClean="0"/>
-          </a:p>
-          <a:p>
-            <a:r>
-              <a:rPr lang="en-GB" dirty="0" err="1"/>
-              <a:t>n</a:t>
-            </a:r>
-            <a:r>
-              <a:rPr lang="en-GB" dirty="0" err="1" smtClean="0"/>
-              <a:t>um</a:t>
-            </a:r>
-            <a:r>
-              <a:rPr lang="en-GB" dirty="0" smtClean="0"/>
-              <a:t>: </a:t>
-            </a:r>
-            <a:r>
-              <a:rPr lang="en-GB" dirty="0" err="1" smtClean="0"/>
-              <a:t>Zähler</a:t>
-            </a:r>
-            <a:r>
-              <a:rPr lang="en-GB" dirty="0" smtClean="0"/>
-              <a:t> </a:t>
-            </a:r>
-            <a:r>
-              <a:rPr lang="en-GB" dirty="0" err="1" smtClean="0"/>
-              <a:t>auslesen</a:t>
-            </a:r>
-            <a:endParaRPr lang="en-GB" dirty="0" smtClean="0"/>
-          </a:p>
-          <a:p>
-            <a:r>
-              <a:rPr lang="en-GB" dirty="0" err="1"/>
-              <a:t>d</a:t>
-            </a:r>
-            <a:r>
-              <a:rPr lang="en-GB" dirty="0" err="1" smtClean="0"/>
-              <a:t>enom</a:t>
-            </a:r>
-            <a:r>
-              <a:rPr lang="en-GB" dirty="0" smtClean="0"/>
-              <a:t>: </a:t>
-            </a:r>
-            <a:r>
-              <a:rPr lang="en-GB" dirty="0" err="1" smtClean="0"/>
-              <a:t>Nenner</a:t>
-            </a:r>
-            <a:r>
-              <a:rPr lang="en-GB" dirty="0" smtClean="0"/>
-              <a:t> </a:t>
-            </a:r>
-            <a:r>
-              <a:rPr lang="en-GB" dirty="0" err="1" smtClean="0"/>
-              <a:t>auslesen</a:t>
-            </a:r>
-            <a:endParaRPr lang="en-GB" dirty="0" smtClean="0"/>
-          </a:p>
-          <a:p>
-            <a:r>
-              <a:rPr lang="en-GB" dirty="0"/>
-              <a:t>f</a:t>
-            </a:r>
-            <a:r>
-              <a:rPr lang="en-GB" dirty="0" smtClean="0"/>
-              <a:t>loor: </a:t>
-            </a:r>
-            <a:r>
-              <a:rPr lang="en-GB" dirty="0" err="1" smtClean="0"/>
-              <a:t>Abrunden</a:t>
-            </a:r>
-            <a:endParaRPr lang="en-GB" dirty="0" smtClean="0"/>
-          </a:p>
-          <a:p>
-            <a:r>
-              <a:rPr lang="en-GB" dirty="0"/>
-              <a:t>c</a:t>
-            </a:r>
-            <a:r>
-              <a:rPr lang="en-GB" dirty="0" smtClean="0"/>
-              <a:t>eil: </a:t>
-            </a:r>
-            <a:r>
-              <a:rPr lang="en-GB" dirty="0" err="1" smtClean="0"/>
-              <a:t>Aufrunden</a:t>
-            </a:r>
-            <a:endParaRPr lang="en-GB" dirty="0" smtClean="0"/>
-          </a:p>
-          <a:p>
-            <a:r>
-              <a:rPr lang="en-GB" dirty="0"/>
-              <a:t>r</a:t>
-            </a:r>
-            <a:r>
-              <a:rPr lang="en-GB" dirty="0" smtClean="0"/>
-              <a:t>ound: </a:t>
-            </a:r>
-            <a:r>
-              <a:rPr lang="en-GB" dirty="0" err="1" smtClean="0"/>
-              <a:t>Runden</a:t>
-            </a:r>
-            <a:endParaRPr lang="en-GB" dirty="0" smtClean="0"/>
-          </a:p>
-          <a:p>
-            <a:r>
-              <a:rPr lang="en-GB" dirty="0" err="1" smtClean="0"/>
-              <a:t>asRatio</a:t>
-            </a:r>
-            <a:r>
-              <a:rPr lang="en-GB" dirty="0" smtClean="0"/>
-              <a:t>: Integer </a:t>
-            </a:r>
-            <a:r>
-              <a:rPr lang="en-GB" dirty="0" err="1" smtClean="0"/>
-              <a:t>als</a:t>
-            </a:r>
-            <a:r>
-              <a:rPr lang="en-GB" dirty="0" smtClean="0"/>
-              <a:t> rationale </a:t>
-            </a:r>
-            <a:r>
-              <a:rPr lang="en-GB" dirty="0" err="1" smtClean="0"/>
-              <a:t>Zahl</a:t>
-            </a:r>
-            <a:r>
-              <a:rPr lang="en-GB" dirty="0" smtClean="0"/>
-              <a:t> </a:t>
-            </a:r>
-            <a:r>
-              <a:rPr lang="en-GB" dirty="0" err="1" smtClean="0"/>
-              <a:t>behandeln</a:t>
-            </a:r>
-            <a:endParaRPr lang="en-GB" dirty="0"/>
-          </a:p>
-        </p:txBody>
-      </p:sp>
-      <p:sp>
-        <p:nvSpPr>
-          <p:cNvPr id="3" name="Title 2"/>
-          <p:cNvSpPr>
-            <a:spLocks noGrp="1"/>
-          </p:cNvSpPr>
-          <p:nvPr>
-            <p:ph type="title"/>
-          </p:nvPr>
-        </p:nvSpPr>
-        <p:spPr/>
-        <p:txBody>
-          <a:bodyPr/>
-          <a:lstStyle/>
-          <a:p>
-            <a:r>
-              <a:rPr lang="en-US" dirty="0" err="1"/>
-              <a:t>Lexikalische</a:t>
-            </a:r>
-            <a:r>
-              <a:rPr lang="en-US" dirty="0"/>
-              <a:t> Syntax</a:t>
-            </a:r>
-            <a:endParaRPr lang="en-GB" dirty="0"/>
-          </a:p>
-        </p:txBody>
-      </p:sp>
-      <p:sp>
-        <p:nvSpPr>
-          <p:cNvPr id="4" name="TextBox 3"/>
-          <p:cNvSpPr txBox="1"/>
-          <p:nvPr/>
-        </p:nvSpPr>
-        <p:spPr>
-          <a:xfrm>
-            <a:off x="4465320" y="4016120"/>
-            <a:ext cx="7117080" cy="1446550"/>
-          </a:xfrm>
-          <a:prstGeom prst="rect">
-            <a:avLst/>
-          </a:prstGeom>
-          <a:noFill/>
-        </p:spPr>
-        <p:txBody>
-          <a:bodyPr wrap="square" rtlCol="0">
-            <a:spAutoFit/>
-          </a:bodyPr>
-          <a:lstStyle/>
-          <a:p>
-            <a:r>
-              <a:rPr lang="en-GB" sz="8800" dirty="0" smtClean="0">
-                <a:solidFill>
-                  <a:schemeClr val="tx2"/>
-                </a:solidFill>
-                <a:latin typeface="Javanese Text" panose="02000000000000000000" pitchFamily="2" charset="0"/>
-              </a:rPr>
-              <a:t>}</a:t>
-            </a:r>
-            <a:endParaRPr lang="en-GB" sz="2800" dirty="0">
-              <a:solidFill>
-                <a:schemeClr val="tx2"/>
-              </a:solidFill>
-              <a:latin typeface="Javanese Text" panose="02000000000000000000" pitchFamily="2" charset="0"/>
-            </a:endParaRPr>
-          </a:p>
-        </p:txBody>
-      </p:sp>
-      <p:sp>
-        <p:nvSpPr>
-          <p:cNvPr id="5" name="TextBox 4"/>
-          <p:cNvSpPr txBox="1"/>
-          <p:nvPr/>
-        </p:nvSpPr>
-        <p:spPr>
-          <a:xfrm>
-            <a:off x="5098882" y="4539100"/>
-            <a:ext cx="3394252" cy="523220"/>
-          </a:xfrm>
-          <a:prstGeom prst="rect">
-            <a:avLst/>
-          </a:prstGeom>
-          <a:noFill/>
-        </p:spPr>
-        <p:txBody>
-          <a:bodyPr wrap="square" rtlCol="0">
-            <a:spAutoFit/>
-          </a:bodyPr>
-          <a:lstStyle/>
-          <a:p>
-            <a:r>
-              <a:rPr lang="en-GB" sz="2800" dirty="0">
-                <a:solidFill>
-                  <a:schemeClr val="tx2"/>
-                </a:solidFill>
-              </a:rPr>
-              <a:t>RATIOOPR</a:t>
-            </a:r>
-          </a:p>
-        </p:txBody>
-      </p:sp>
-    </p:spTree>
-    <p:extLst>
-      <p:ext uri="{BB962C8B-B14F-4D97-AF65-F5344CB8AC3E}">
-        <p14:creationId xmlns:p14="http://schemas.microsoft.com/office/powerpoint/2010/main" val="4274827622"/>
-      </p:ext>
-    </p:extLst>
-  </p:cSld>
-  <p:clrMapOvr>
-    <a:masterClrMapping/>
-  </p:clrMapOvr>
-  <mc:AlternateContent xmlns:mc="http://schemas.openxmlformats.org/markup-compatibility/2006" xmlns:p14="http://schemas.microsoft.com/office/powerpoint/2010/main">
-    <mc:Choice Requires="p14">
-      <p:transition spd="med" p14:dur="700">
-        <p:fade/>
-      </p:transition>
-    </mc:Choice>
-    <mc:Fallback xmlns="">
-      <p:transition spd="med">
-        <p:fade/>
-      </p:transition>
-    </mc:Fallback>
-  </mc:AlternateContent>
-</p:sld>
-</file>
-
-<file path=ppt/slides/slide5.xml><?xml version="1.0" encoding="utf-8"?>
-<p:sld xmlns:a="http://schemas.openxmlformats.org/drawingml/2006/main" xmlns:r="http://schemas.openxmlformats.org/officeDocument/2006/relationships" xmlns:p="http://schemas.openxmlformats.org/presentationml/2006/main">
-  <p:cSld>
-    <p:spTree>
-      <p:nvGrpSpPr>
-        <p:cNvPr id="1" name=""/>
-        <p:cNvGrpSpPr/>
-        <p:nvPr/>
-      </p:nvGrpSpPr>
-      <p:grpSpPr>
-        <a:xfrm>
-          <a:off x="0" y="0"/>
-          <a:ext cx="0" cy="0"/>
-          <a:chOff x="0" y="0"/>
-          <a:chExt cx="0" cy="0"/>
-        </a:xfrm>
-      </p:grpSpPr>
-      <p:sp>
-        <p:nvSpPr>
-          <p:cNvPr id="3" name="Content Placeholder 2"/>
-          <p:cNvSpPr>
-            <a:spLocks noGrp="1"/>
-          </p:cNvSpPr>
-          <p:nvPr>
-            <p:ph idx="1"/>
-          </p:nvPr>
-        </p:nvSpPr>
-        <p:spPr/>
-        <p:txBody>
-          <a:bodyPr/>
-          <a:lstStyle/>
-          <a:p>
-            <a:r>
-              <a:rPr lang="en-US" dirty="0" err="1" smtClean="0"/>
-              <a:t>Erweiterung</a:t>
-            </a:r>
-            <a:r>
-              <a:rPr lang="en-US" dirty="0" smtClean="0"/>
-              <a:t> der Grammatik um die </a:t>
-            </a:r>
-            <a:r>
-              <a:rPr lang="en-US" dirty="0" err="1" smtClean="0"/>
-              <a:t>folgende</a:t>
-            </a:r>
-            <a:r>
-              <a:rPr lang="en-US" dirty="0" smtClean="0"/>
-              <a:t> Regel:</a:t>
-            </a:r>
-          </a:p>
-          <a:p>
-            <a:pPr lvl="1"/>
-            <a:endParaRPr lang="en-US" dirty="0"/>
-          </a:p>
-          <a:p>
-            <a:pPr marL="411480" lvl="1" indent="0">
-              <a:buNone/>
-            </a:pPr>
-            <a:r>
-              <a:rPr lang="en-US" dirty="0" err="1" smtClean="0"/>
-              <a:t>monadicOpr</a:t>
-            </a:r>
-            <a:r>
-              <a:rPr lang="en-US" dirty="0" smtClean="0"/>
-              <a:t> ::= </a:t>
-            </a:r>
-            <a:r>
-              <a:rPr lang="en-US" dirty="0" smtClean="0"/>
-              <a:t>RATIOOPR | </a:t>
-            </a:r>
-            <a:r>
-              <a:rPr lang="en-US" dirty="0" err="1" smtClean="0"/>
-              <a:t>asRatio</a:t>
-            </a:r>
-            <a:endParaRPr lang="en-US" dirty="0" smtClean="0"/>
-          </a:p>
-          <a:p>
-            <a:pPr marL="411480" lvl="1" indent="0">
-              <a:buNone/>
-            </a:pPr>
-            <a:endParaRPr lang="en-US" dirty="0"/>
-          </a:p>
-          <a:p>
-            <a:r>
-              <a:rPr lang="en-US" dirty="0" err="1" smtClean="0"/>
-              <a:t>Präzedenz</a:t>
-            </a:r>
-            <a:r>
-              <a:rPr lang="en-US" dirty="0" smtClean="0"/>
-              <a:t> </a:t>
-            </a:r>
-            <a:r>
-              <a:rPr lang="en-US" dirty="0" err="1" smtClean="0"/>
-              <a:t>wie</a:t>
-            </a:r>
-            <a:r>
-              <a:rPr lang="en-US" dirty="0" smtClean="0"/>
-              <a:t> </a:t>
-            </a:r>
-            <a:r>
-              <a:rPr lang="en-US" dirty="0" err="1" smtClean="0"/>
-              <a:t>andere</a:t>
-            </a:r>
-            <a:r>
-              <a:rPr lang="en-US" dirty="0" smtClean="0"/>
-              <a:t> </a:t>
-            </a:r>
-            <a:r>
-              <a:rPr lang="en-US" dirty="0" err="1" smtClean="0"/>
-              <a:t>monadische</a:t>
-            </a:r>
-            <a:r>
-              <a:rPr lang="en-US" dirty="0" smtClean="0"/>
-              <a:t> </a:t>
-            </a:r>
-            <a:r>
-              <a:rPr lang="en-US" dirty="0" err="1" smtClean="0"/>
-              <a:t>Operatoren</a:t>
-            </a:r>
-            <a:r>
-              <a:rPr lang="en-US" dirty="0" smtClean="0"/>
-              <a:t> (NOT, +, -)</a:t>
-            </a:r>
-          </a:p>
-          <a:p>
-            <a:r>
-              <a:rPr lang="en-US" dirty="0" err="1" smtClean="0"/>
-              <a:t>Keine</a:t>
-            </a:r>
-            <a:r>
-              <a:rPr lang="en-US" dirty="0" smtClean="0"/>
-              <a:t> </a:t>
-            </a:r>
-            <a:r>
-              <a:rPr lang="en-GB" dirty="0"/>
-              <a:t>Assoziativität</a:t>
-            </a:r>
-            <a:br>
-              <a:rPr lang="en-GB" dirty="0"/>
-            </a:br>
-            <a:endParaRPr lang="en-US" dirty="0" smtClean="0"/>
-          </a:p>
-        </p:txBody>
-      </p:sp>
-      <p:sp>
-        <p:nvSpPr>
-          <p:cNvPr id="2" name="Title 1"/>
-          <p:cNvSpPr>
-            <a:spLocks noGrp="1"/>
-          </p:cNvSpPr>
-          <p:nvPr>
-            <p:ph type="title"/>
-          </p:nvPr>
-        </p:nvSpPr>
-        <p:spPr/>
-        <p:txBody>
-          <a:bodyPr/>
-          <a:lstStyle/>
-          <a:p>
-            <a:r>
-              <a:rPr lang="en-US" dirty="0" err="1" smtClean="0"/>
-              <a:t>Grammatikalische</a:t>
-            </a:r>
-            <a:r>
-              <a:rPr lang="en-US" dirty="0" smtClean="0"/>
-              <a:t> Syntax</a:t>
-            </a:r>
-            <a:endParaRPr lang="en-US" dirty="0"/>
-          </a:p>
-        </p:txBody>
-      </p:sp>
-    </p:spTree>
-    <p:extLst>
-      <p:ext uri="{BB962C8B-B14F-4D97-AF65-F5344CB8AC3E}">
-        <p14:creationId xmlns:p14="http://schemas.microsoft.com/office/powerpoint/2010/main" val="384888077"/>
-      </p:ext>
-    </p:extLst>
-  </p:cSld>
-  <p:clrMapOvr>
-    <a:masterClrMapping/>
-  </p:clrMapOvr>
-  <mc:AlternateContent xmlns:mc="http://schemas.openxmlformats.org/markup-compatibility/2006" xmlns:p14="http://schemas.microsoft.com/office/powerpoint/2010/main">
-    <mc:Choice Requires="p14">
-      <p:transition spd="med" p14:dur="700">
-        <p:fade/>
-      </p:transition>
-    </mc:Choice>
-    <mc:Fallback xmlns="">
-      <p:transition spd="med">
-        <p:fade/>
-      </p:transition>
-    </mc:Fallback>
-  </mc:AlternateContent>
-</p:sld>
-</file>
-
-<file path=ppt/slides/slide6.xml><?xml version="1.0" encoding="utf-8"?>
-<p:sld xmlns:a="http://schemas.openxmlformats.org/drawingml/2006/main" xmlns:r="http://schemas.openxmlformats.org/officeDocument/2006/relationships" xmlns:p="http://schemas.openxmlformats.org/presentationml/2006/main">
-  <p:cSld>
-    <p:spTree>
-      <p:nvGrpSpPr>
-        <p:cNvPr id="1" name=""/>
-        <p:cNvGrpSpPr/>
-        <p:nvPr/>
-      </p:nvGrpSpPr>
-      <p:grpSpPr>
-        <a:xfrm>
-          <a:off x="0" y="0"/>
-          <a:ext cx="0" cy="0"/>
-          <a:chOff x="0" y="0"/>
-          <a:chExt cx="0" cy="0"/>
-        </a:xfrm>
-      </p:grpSpPr>
-      <p:sp>
-        <p:nvSpPr>
-          <p:cNvPr id="3" name="Content Placeholder 2"/>
-          <p:cNvSpPr>
-            <a:spLocks noGrp="1"/>
-          </p:cNvSpPr>
-          <p:nvPr>
-            <p:ph idx="1"/>
-          </p:nvPr>
-        </p:nvSpPr>
-        <p:spPr/>
-        <p:txBody>
-          <a:bodyPr/>
-          <a:lstStyle/>
-          <a:p>
-            <a:r>
-              <a:rPr lang="en-US" dirty="0" smtClean="0"/>
-              <a:t>RATIOOPR </a:t>
-            </a:r>
-            <a:r>
-              <a:rPr lang="en-US" dirty="0" err="1" smtClean="0"/>
-              <a:t>unterstützen</a:t>
-            </a:r>
-            <a:r>
-              <a:rPr lang="en-US" dirty="0" smtClean="0"/>
-              <a:t> </a:t>
-            </a:r>
-            <a:r>
-              <a:rPr lang="en-US" dirty="0" err="1" smtClean="0"/>
-              <a:t>als</a:t>
-            </a:r>
-            <a:r>
-              <a:rPr lang="en-US" dirty="0" smtClean="0"/>
-              <a:t> Argument </a:t>
-            </a:r>
-            <a:r>
-              <a:rPr lang="en-US" dirty="0" err="1" smtClean="0"/>
-              <a:t>nur</a:t>
-            </a:r>
-            <a:r>
-              <a:rPr lang="en-US" dirty="0" smtClean="0"/>
-              <a:t> </a:t>
-            </a:r>
-            <a:r>
-              <a:rPr lang="en-US" dirty="0" err="1" smtClean="0"/>
-              <a:t>RatioVal</a:t>
-            </a:r>
-            <a:endParaRPr lang="en-US" dirty="0"/>
-          </a:p>
-          <a:p>
-            <a:r>
-              <a:rPr lang="en-US" dirty="0" err="1" smtClean="0"/>
-              <a:t>Für</a:t>
-            </a:r>
-            <a:r>
-              <a:rPr lang="en-US" dirty="0" smtClean="0"/>
-              <a:t> MULTOPR, ADDOPR und RELOPR</a:t>
-            </a:r>
-          </a:p>
-          <a:p>
-            <a:pPr lvl="1"/>
-            <a:r>
-              <a:rPr lang="en-US" dirty="0" smtClean="0"/>
-              <a:t>Integer-</a:t>
-            </a:r>
-            <a:r>
-              <a:rPr lang="en-US" dirty="0" err="1" smtClean="0"/>
-              <a:t>Argumente</a:t>
-            </a:r>
-            <a:r>
-              <a:rPr lang="en-US" dirty="0" smtClean="0"/>
-              <a:t> </a:t>
-            </a:r>
-            <a:r>
-              <a:rPr lang="en-US" dirty="0" err="1" smtClean="0"/>
-              <a:t>werden</a:t>
-            </a:r>
-            <a:r>
-              <a:rPr lang="en-US" dirty="0" smtClean="0"/>
-              <a:t> in </a:t>
-            </a:r>
-            <a:r>
-              <a:rPr lang="en-US" dirty="0" err="1" smtClean="0"/>
-              <a:t>RatioVal</a:t>
-            </a:r>
-            <a:r>
-              <a:rPr lang="en-US" dirty="0" smtClean="0"/>
-              <a:t> </a:t>
-            </a:r>
-            <a:r>
-              <a:rPr lang="en-US" dirty="0" err="1" smtClean="0"/>
-              <a:t>konvertiert</a:t>
-            </a:r>
-            <a:endParaRPr lang="en-US" dirty="0" smtClean="0"/>
-          </a:p>
-          <a:p>
-            <a:endParaRPr lang="en-US" dirty="0"/>
-          </a:p>
-        </p:txBody>
-      </p:sp>
-      <p:sp>
-        <p:nvSpPr>
-          <p:cNvPr id="2" name="Title 1"/>
-          <p:cNvSpPr>
-            <a:spLocks noGrp="1"/>
-          </p:cNvSpPr>
-          <p:nvPr>
-            <p:ph type="title"/>
-          </p:nvPr>
-        </p:nvSpPr>
-        <p:spPr/>
-        <p:txBody>
-          <a:bodyPr>
-            <a:normAutofit/>
-          </a:bodyPr>
-          <a:lstStyle/>
-          <a:p>
-            <a:r>
-              <a:rPr lang="en-US" dirty="0" err="1" smtClean="0"/>
-              <a:t>Einschränkungen</a:t>
-            </a:r>
-            <a:endParaRPr lang="en-US" dirty="0"/>
-          </a:p>
-        </p:txBody>
-      </p:sp>
-    </p:spTree>
-    <p:extLst>
-      <p:ext uri="{BB962C8B-B14F-4D97-AF65-F5344CB8AC3E}">
-        <p14:creationId xmlns:p14="http://schemas.microsoft.com/office/powerpoint/2010/main" val="3514341159"/>
-      </p:ext>
-    </p:extLst>
-  </p:cSld>
-  <p:clrMapOvr>
-    <a:masterClrMapping/>
-  </p:clrMapOvr>
-  <mc:AlternateContent xmlns:mc="http://schemas.openxmlformats.org/markup-compatibility/2006" xmlns:p14="http://schemas.microsoft.com/office/powerpoint/2010/main">
-    <mc:Choice Requires="p14">
-      <p:transition spd="med" p14:dur="700">
-        <p:fade/>
-      </p:transition>
-    </mc:Choice>
-    <mc:Fallback xmlns="">
-      <p:transition spd="med">
-        <p:fade/>
-      </p:transition>
-    </mc:Fallback>
-  </mc:AlternateContent>
-</p:sld>
-</file>
-
-<file path=ppt/slides/slide7.xml><?xml version="1.0" encoding="utf-8"?>
-<p:sld xmlns:a="http://schemas.openxmlformats.org/drawingml/2006/main" xmlns:r="http://schemas.openxmlformats.org/officeDocument/2006/relationships" xmlns:p="http://schemas.openxmlformats.org/presentationml/2006/main">
-  <p:cSld>
-    <p:spTree>
-      <p:nvGrpSpPr>
-        <p:cNvPr id="1" name=""/>
-        <p:cNvGrpSpPr/>
-        <p:nvPr/>
-      </p:nvGrpSpPr>
-      <p:grpSpPr>
-        <a:xfrm>
-          <a:off x="0" y="0"/>
-          <a:ext cx="0" cy="0"/>
-          <a:chOff x="0" y="0"/>
-          <a:chExt cx="0" cy="0"/>
-        </a:xfrm>
-      </p:grpSpPr>
-      <p:sp>
-        <p:nvSpPr>
-          <p:cNvPr id="2" name="Content Placeholder 1"/>
-          <p:cNvSpPr>
-            <a:spLocks noGrp="1"/>
-          </p:cNvSpPr>
-          <p:nvPr>
-            <p:ph idx="1"/>
-          </p:nvPr>
-        </p:nvSpPr>
-        <p:spPr/>
-        <p:txBody>
-          <a:bodyPr/>
-          <a:lstStyle/>
-          <a:p>
-            <a:r>
-              <a:rPr lang="en-GB" dirty="0" err="1" smtClean="0"/>
-              <a:t>Neuer</a:t>
-            </a:r>
-            <a:r>
-              <a:rPr lang="en-GB" dirty="0" smtClean="0"/>
-              <a:t> </a:t>
-            </a:r>
-            <a:r>
-              <a:rPr lang="en-GB" dirty="0" err="1" smtClean="0"/>
-              <a:t>Datentyp</a:t>
-            </a:r>
-            <a:r>
-              <a:rPr lang="en-GB" dirty="0" smtClean="0"/>
-              <a:t> </a:t>
-            </a:r>
-            <a:r>
-              <a:rPr lang="en-GB" dirty="0" err="1" smtClean="0"/>
-              <a:t>RatioData</a:t>
-            </a:r>
-            <a:r>
-              <a:rPr lang="en-GB" dirty="0" smtClean="0"/>
-              <a:t> (</a:t>
-            </a:r>
-            <a:r>
-              <a:rPr lang="en-GB" dirty="0" err="1" smtClean="0"/>
-              <a:t>wie</a:t>
-            </a:r>
-            <a:r>
-              <a:rPr lang="en-GB" dirty="0" smtClean="0"/>
-              <a:t> </a:t>
-            </a:r>
-            <a:r>
-              <a:rPr lang="en-GB" dirty="0" err="1" smtClean="0"/>
-              <a:t>IntData</a:t>
-            </a:r>
-            <a:r>
-              <a:rPr lang="en-GB" dirty="0" smtClean="0"/>
-              <a:t>, </a:t>
-            </a:r>
-            <a:r>
-              <a:rPr lang="en-GB" dirty="0" err="1" smtClean="0"/>
-              <a:t>BoolData</a:t>
-            </a:r>
-            <a:r>
-              <a:rPr lang="en-GB" dirty="0" smtClean="0"/>
-              <a:t>)</a:t>
-            </a:r>
-          </a:p>
-          <a:p>
-            <a:r>
-              <a:rPr lang="en-GB" dirty="0" err="1" smtClean="0"/>
-              <a:t>Gibt</a:t>
-            </a:r>
-            <a:r>
-              <a:rPr lang="en-GB" dirty="0" smtClean="0"/>
-              <a:t> </a:t>
-            </a:r>
-            <a:r>
-              <a:rPr lang="en-GB" dirty="0" err="1" smtClean="0"/>
-              <a:t>immer</a:t>
-            </a:r>
-            <a:r>
-              <a:rPr lang="en-GB" dirty="0" smtClean="0"/>
-              <a:t> </a:t>
-            </a:r>
-            <a:r>
-              <a:rPr lang="en-GB" dirty="0" err="1" smtClean="0"/>
               <a:t>gekürzten</a:t>
             </a:r>
             <a:r>
               <a:rPr lang="en-GB" dirty="0" smtClean="0"/>
-              <a:t> </a:t>
-            </a:r>
-            <a:r>
-              <a:rPr lang="en-GB" dirty="0" smtClean="0"/>
-              <a:t>Bruch </a:t>
+              <a:t> Bruch </a:t>
             </a:r>
             <a:r>
               <a:rPr lang="en-GB" dirty="0" err="1" smtClean="0"/>
@@ -7055,7 +5657,7 @@
 </p:sld>
 </file>
 
-<file path=ppt/slides/slide8.xml><?xml version="1.0" encoding="utf-8"?>
+<file path=ppt/slides/slide11.xml><?xml version="1.0" encoding="utf-8"?>
 <p:sld xmlns:a="http://schemas.openxmlformats.org/drawingml/2006/main" xmlns:r="http://schemas.openxmlformats.org/officeDocument/2006/relationships" xmlns:p="http://schemas.openxmlformats.org/presentationml/2006/main">
   <p:cSld>
     <p:spTree>
@@ -7306,7 +5908,7 @@
 </p:sld>
 </file>
 
-<file path=ppt/slides/slide9.xml><?xml version="1.0" encoding="utf-8"?>
+<file path=ppt/slides/slide12.xml><?xml version="1.0" encoding="utf-8"?>
 <p:sld xmlns:a="http://schemas.openxmlformats.org/drawingml/2006/main" xmlns:r="http://schemas.openxmlformats.org/officeDocument/2006/relationships" xmlns:p="http://schemas.openxmlformats.org/presentationml/2006/main">
   <p:cSld>
     <p:spTree>
@@ -7410,49 +6012,49 @@
                 <a:gridCol w="1567543">
                   <a:extLst>
                     <a:ext uri="{9D8B030D-6E8A-4147-A177-3AD203B41FA5}">
-                      <a16:colId xmlns:a16="http://schemas.microsoft.com/office/drawing/2014/main" xmlns="" val="3432858941"/>
+                      <a16:colId xmlns="" xmlns:a16="http://schemas.microsoft.com/office/drawing/2014/main" val="3432858941"/>
                     </a:ext>
                   </a:extLst>
                 </a:gridCol>
                 <a:gridCol w="1567543">
                   <a:extLst>
                     <a:ext uri="{9D8B030D-6E8A-4147-A177-3AD203B41FA5}">
-                      <a16:colId xmlns:a16="http://schemas.microsoft.com/office/drawing/2014/main" xmlns="" val="685891753"/>
+                      <a16:colId xmlns="" xmlns:a16="http://schemas.microsoft.com/office/drawing/2014/main" val="685891753"/>
                     </a:ext>
                   </a:extLst>
                 </a:gridCol>
                 <a:gridCol w="1567543">
                   <a:extLst>
                     <a:ext uri="{9D8B030D-6E8A-4147-A177-3AD203B41FA5}">
-                      <a16:colId xmlns:a16="http://schemas.microsoft.com/office/drawing/2014/main" xmlns="" val="410249664"/>
+                      <a16:colId xmlns="" xmlns:a16="http://schemas.microsoft.com/office/drawing/2014/main" val="410249664"/>
                     </a:ext>
                   </a:extLst>
                 </a:gridCol>
                 <a:gridCol w="2020224">
                   <a:extLst>
                     <a:ext uri="{9D8B030D-6E8A-4147-A177-3AD203B41FA5}">
-                      <a16:colId xmlns:a16="http://schemas.microsoft.com/office/drawing/2014/main" xmlns="" val="2254893949"/>
+                      <a16:colId xmlns="" xmlns:a16="http://schemas.microsoft.com/office/drawing/2014/main" val="2254893949"/>
                     </a:ext>
                   </a:extLst>
                 </a:gridCol>
                 <a:gridCol w="862641">
                   <a:extLst>
                     <a:ext uri="{9D8B030D-6E8A-4147-A177-3AD203B41FA5}">
-                      <a16:colId xmlns:a16="http://schemas.microsoft.com/office/drawing/2014/main" xmlns="" val="2351044014"/>
+                      <a16:colId xmlns="" xmlns:a16="http://schemas.microsoft.com/office/drawing/2014/main" val="2351044014"/>
                     </a:ext>
                   </a:extLst>
                 </a:gridCol>
                 <a:gridCol w="2478657">
                   <a:extLst>
                     <a:ext uri="{9D8B030D-6E8A-4147-A177-3AD203B41FA5}">
-                      <a16:colId xmlns:a16="http://schemas.microsoft.com/office/drawing/2014/main" xmlns="" val="1806089394"/>
+                      <a16:colId xmlns="" xmlns:a16="http://schemas.microsoft.com/office/drawing/2014/main" val="1806089394"/>
                     </a:ext>
                   </a:extLst>
                 </a:gridCol>
                 <a:gridCol w="908650">
                   <a:extLst>
                     <a:ext uri="{9D8B030D-6E8A-4147-A177-3AD203B41FA5}">
-                      <a16:colId xmlns:a16="http://schemas.microsoft.com/office/drawing/2014/main" xmlns="" val="2597290812"/>
+                      <a16:colId xmlns="" xmlns:a16="http://schemas.microsoft.com/office/drawing/2014/main" val="2597290812"/>
                     </a:ext>
                   </a:extLst>
                 </a:gridCol>
@@ -7562,7 +6164,7 @@
                 </a:tc>
                 <a:extLst>
                   <a:ext uri="{0D108BD9-81ED-4DB2-BD59-A6C34878D82A}">
-                    <a16:rowId xmlns:a16="http://schemas.microsoft.com/office/drawing/2014/main" xmlns="" val="1571211460"/>
+                    <a16:rowId xmlns="" xmlns:a16="http://schemas.microsoft.com/office/drawing/2014/main" val="1571211460"/>
                   </a:ext>
                 </a:extLst>
               </a:tr>
@@ -7667,7 +6269,7 @@
                 </a:tc>
                 <a:extLst>
                   <a:ext uri="{0D108BD9-81ED-4DB2-BD59-A6C34878D82A}">
-                    <a16:rowId xmlns:a16="http://schemas.microsoft.com/office/drawing/2014/main" xmlns="" val="3714758531"/>
+                    <a16:rowId xmlns="" xmlns:a16="http://schemas.microsoft.com/office/drawing/2014/main" val="3714758531"/>
                   </a:ext>
                 </a:extLst>
               </a:tr>
@@ -7679,6 +6281,2279 @@
     <p:extLst>
       <p:ext uri="{BB962C8B-B14F-4D97-AF65-F5344CB8AC3E}">
         <p14:creationId xmlns:p14="http://schemas.microsoft.com/office/powerpoint/2010/main" val="3486482547"/>
+      </p:ext>
+    </p:extLst>
+  </p:cSld>
+  <p:clrMapOvr>
+    <a:masterClrMapping/>
+  </p:clrMapOvr>
+  <mc:AlternateContent xmlns:mc="http://schemas.openxmlformats.org/markup-compatibility/2006" xmlns:p14="http://schemas.microsoft.com/office/powerpoint/2010/main">
+    <mc:Choice Requires="p14">
+      <p:transition spd="med" p14:dur="700">
+        <p:fade/>
+      </p:transition>
+    </mc:Choice>
+    <mc:Fallback xmlns="">
+      <p:transition spd="med">
+        <p:fade/>
+      </p:transition>
+    </mc:Fallback>
+  </mc:AlternateContent>
+</p:sld>
+</file>
+
+<file path=ppt/slides/slide13.xml><?xml version="1.0" encoding="utf-8"?>
+<p:sld xmlns:a="http://schemas.openxmlformats.org/drawingml/2006/main" xmlns:r="http://schemas.openxmlformats.org/officeDocument/2006/relationships" xmlns:p="http://schemas.openxmlformats.org/presentationml/2006/main">
+  <p:cSld>
+    <p:spTree>
+      <p:nvGrpSpPr>
+        <p:cNvPr id="1" name=""/>
+        <p:cNvGrpSpPr/>
+        <p:nvPr/>
+      </p:nvGrpSpPr>
+      <p:grpSpPr>
+        <a:xfrm>
+          <a:off x="0" y="0"/>
+          <a:ext cx="0" cy="0"/>
+          <a:chOff x="0" y="0"/>
+          <a:chExt cx="0" cy="0"/>
+        </a:xfrm>
+      </p:grpSpPr>
+      <p:sp>
+        <p:nvSpPr>
+          <p:cNvPr id="2" name="Content Placeholder 1"/>
+          <p:cNvSpPr>
+            <a:spLocks noGrp="1"/>
+          </p:cNvSpPr>
+          <p:nvPr>
+            <p:ph idx="1"/>
+          </p:nvPr>
+        </p:nvSpPr>
+        <p:spPr/>
+        <p:txBody>
+          <a:bodyPr/>
+          <a:lstStyle/>
+          <a:p>
+            <a:r>
+              <a:rPr lang="en-GB" dirty="0" err="1" smtClean="0"/>
+              <a:t>Einlesen</a:t>
+            </a:r>
+            <a:r>
+              <a:rPr lang="en-GB" dirty="0" smtClean="0"/>
+              <a:t> der </a:t>
+            </a:r>
+            <a:r>
+              <a:rPr lang="en-GB" dirty="0" err="1" smtClean="0"/>
+              <a:t>erreichten</a:t>
+            </a:r>
+            <a:r>
+              <a:rPr lang="en-GB" dirty="0" smtClean="0"/>
+              <a:t> </a:t>
+            </a:r>
+            <a:r>
+              <a:rPr lang="en-GB" dirty="0" err="1" smtClean="0"/>
+              <a:t>Punktezahl</a:t>
+            </a:r>
+            <a:r>
+              <a:rPr lang="en-GB" dirty="0" smtClean="0"/>
+              <a:t> und der </a:t>
+            </a:r>
+            <a:r>
+              <a:rPr lang="en-GB" dirty="0" err="1" smtClean="0"/>
+              <a:t>maximalen</a:t>
+            </a:r>
+            <a:r>
+              <a:rPr lang="en-GB" dirty="0" smtClean="0"/>
+              <a:t> </a:t>
+            </a:r>
+            <a:r>
+              <a:rPr lang="en-GB" dirty="0" err="1" smtClean="0"/>
+              <a:t>Punktezahl</a:t>
+            </a:r>
+            <a:endParaRPr lang="en-GB" dirty="0" smtClean="0"/>
+          </a:p>
+          <a:p>
+            <a:r>
+              <a:rPr lang="en-GB" dirty="0" err="1" smtClean="0"/>
+              <a:t>Notenberechnung</a:t>
+            </a:r>
+            <a:r>
+              <a:rPr lang="en-GB" dirty="0" smtClean="0"/>
+              <a:t> via </a:t>
+            </a:r>
+            <a:r>
+              <a:rPr lang="en-GB" dirty="0" err="1" smtClean="0"/>
+              <a:t>Standardformel</a:t>
+            </a:r>
+            <a:r>
+              <a:rPr lang="en-GB" dirty="0" smtClean="0"/>
+              <a:t>:</a:t>
+            </a:r>
+            <a:br>
+              <a:rPr lang="en-GB" dirty="0" smtClean="0"/>
+            </a:br>
+            <a:r>
+              <a:rPr lang="en-GB" dirty="0" smtClean="0"/>
+              <a:t/>
+            </a:r>
+            <a:br>
+              <a:rPr lang="en-GB" dirty="0" smtClean="0"/>
+            </a:br>
+            <a:r>
+              <a:rPr lang="en-GB" dirty="0" smtClean="0"/>
+              <a:t>Note := (</a:t>
+            </a:r>
+            <a:r>
+              <a:rPr lang="en-GB" dirty="0" err="1" smtClean="0"/>
+              <a:t>asRatio</a:t>
+            </a:r>
+            <a:r>
+              <a:rPr lang="en-GB" dirty="0" smtClean="0"/>
+              <a:t> </a:t>
+            </a:r>
+            <a:r>
+              <a:rPr lang="en-GB" dirty="0" err="1" smtClean="0"/>
+              <a:t>Punkte</a:t>
+            </a:r>
+            <a:r>
+              <a:rPr lang="en-GB" dirty="0" smtClean="0"/>
+              <a:t>) * 5 / </a:t>
+            </a:r>
+            <a:r>
+              <a:rPr lang="en-GB" dirty="0" err="1" smtClean="0"/>
+              <a:t>MaximalPunkte</a:t>
+            </a:r>
+            <a:r>
+              <a:rPr lang="en-GB" dirty="0" smtClean="0"/>
+              <a:t> </a:t>
+            </a:r>
+          </a:p>
+          <a:p>
+            <a:endParaRPr lang="en-GB" dirty="0"/>
+          </a:p>
+          <a:p>
+            <a:r>
+              <a:rPr lang="en-GB" dirty="0" err="1" smtClean="0"/>
+              <a:t>Rundung</a:t>
+            </a:r>
+            <a:r>
+              <a:rPr lang="en-GB" dirty="0" smtClean="0"/>
+              <a:t> auf </a:t>
+            </a:r>
+            <a:r>
+              <a:rPr lang="en-GB" dirty="0" err="1" smtClean="0"/>
+              <a:t>Zehntel</a:t>
+            </a:r>
+            <a:r>
+              <a:rPr lang="en-GB" dirty="0" smtClean="0"/>
+              <a:t> </a:t>
+            </a:r>
+            <a:r>
+              <a:rPr lang="en-GB" dirty="0" err="1" smtClean="0"/>
+              <a:t>mit</a:t>
+            </a:r>
+            <a:r>
+              <a:rPr lang="en-GB" dirty="0" smtClean="0"/>
+              <a:t>:</a:t>
+            </a:r>
+            <a:br>
+              <a:rPr lang="en-GB" dirty="0" smtClean="0"/>
+            </a:br>
+            <a:r>
+              <a:rPr lang="en-GB" dirty="0" smtClean="0"/>
+              <a:t/>
+            </a:r>
+            <a:br>
+              <a:rPr lang="en-GB" dirty="0" smtClean="0"/>
+            </a:br>
+            <a:r>
+              <a:rPr lang="en-GB" dirty="0" smtClean="0"/>
+              <a:t>Note := (round (Note * 10)) / (</a:t>
+            </a:r>
+            <a:r>
+              <a:rPr lang="en-GB" dirty="0" err="1" smtClean="0"/>
+              <a:t>asRatio</a:t>
+            </a:r>
+            <a:r>
+              <a:rPr lang="en-GB" dirty="0" smtClean="0"/>
+              <a:t> 10)</a:t>
+            </a:r>
+          </a:p>
+        </p:txBody>
+      </p:sp>
+      <p:sp>
+        <p:nvSpPr>
+          <p:cNvPr id="3" name="Title 2"/>
+          <p:cNvSpPr>
+            <a:spLocks noGrp="1"/>
+          </p:cNvSpPr>
+          <p:nvPr>
+            <p:ph type="title"/>
+          </p:nvPr>
+        </p:nvSpPr>
+        <p:spPr/>
+        <p:txBody>
+          <a:bodyPr/>
+          <a:lstStyle/>
+          <a:p>
+            <a:r>
+              <a:rPr lang="en-GB" dirty="0" smtClean="0"/>
+              <a:t>Demo</a:t>
+            </a:r>
+            <a:endParaRPr lang="en-GB" dirty="0"/>
+          </a:p>
+        </p:txBody>
+      </p:sp>
+    </p:spTree>
+    <p:extLst>
+      <p:ext uri="{BB962C8B-B14F-4D97-AF65-F5344CB8AC3E}">
+        <p14:creationId xmlns:p14="http://schemas.microsoft.com/office/powerpoint/2010/main" val="749255209"/>
+      </p:ext>
+    </p:extLst>
+  </p:cSld>
+  <p:clrMapOvr>
+    <a:masterClrMapping/>
+  </p:clrMapOvr>
+  <mc:AlternateContent xmlns:mc="http://schemas.openxmlformats.org/markup-compatibility/2006" xmlns:p14="http://schemas.microsoft.com/office/powerpoint/2010/main">
+    <mc:Choice Requires="p14">
+      <p:transition spd="med" p14:dur="700">
+        <p:fade/>
+      </p:transition>
+    </mc:Choice>
+    <mc:Fallback xmlns="">
+      <p:transition spd="med">
+        <p:fade/>
+      </p:transition>
+    </mc:Fallback>
+  </mc:AlternateContent>
+</p:sld>
+</file>
+
+<file path=ppt/slides/slide2.xml><?xml version="1.0" encoding="utf-8"?>
+<p:sld xmlns:a="http://schemas.openxmlformats.org/drawingml/2006/main" xmlns:r="http://schemas.openxmlformats.org/officeDocument/2006/relationships" xmlns:p="http://schemas.openxmlformats.org/presentationml/2006/main">
+  <p:cSld>
+    <p:spTree>
+      <p:nvGrpSpPr>
+        <p:cNvPr id="1" name=""/>
+        <p:cNvGrpSpPr/>
+        <p:nvPr/>
+      </p:nvGrpSpPr>
+      <p:grpSpPr>
+        <a:xfrm>
+          <a:off x="0" y="0"/>
+          <a:ext cx="0" cy="0"/>
+          <a:chOff x="0" y="0"/>
+          <a:chExt cx="0" cy="0"/>
+        </a:xfrm>
+      </p:grpSpPr>
+      <p:sp>
+        <p:nvSpPr>
+          <p:cNvPr id="3" name="Content Placeholder 2"/>
+          <p:cNvSpPr>
+            <a:spLocks noGrp="1"/>
+          </p:cNvSpPr>
+          <p:nvPr>
+            <p:ph idx="1"/>
+          </p:nvPr>
+        </p:nvSpPr>
+        <p:spPr/>
+        <p:txBody>
+          <a:bodyPr/>
+          <a:lstStyle/>
+          <a:p>
+            <a:r>
+              <a:rPr lang="en-US" dirty="0" err="1" smtClean="0"/>
+              <a:t>Einführung</a:t>
+            </a:r>
+            <a:r>
+              <a:rPr lang="en-US" dirty="0" smtClean="0"/>
+              <a:t> </a:t>
+            </a:r>
+            <a:r>
+              <a:rPr lang="en-US" dirty="0" err="1" smtClean="0"/>
+              <a:t>eines</a:t>
+            </a:r>
+            <a:r>
+              <a:rPr lang="en-US" dirty="0" smtClean="0"/>
+              <a:t> </a:t>
+            </a:r>
+            <a:r>
+              <a:rPr lang="en-US" dirty="0" err="1" smtClean="0"/>
+              <a:t>neuen</a:t>
+            </a:r>
+            <a:r>
+              <a:rPr lang="en-US" dirty="0" smtClean="0"/>
+              <a:t> </a:t>
+            </a:r>
+            <a:r>
+              <a:rPr lang="en-US" dirty="0" err="1" smtClean="0"/>
+              <a:t>Datentyps</a:t>
+            </a:r>
+            <a:r>
+              <a:rPr lang="en-US" dirty="0" smtClean="0"/>
+              <a:t> </a:t>
+            </a:r>
+            <a:r>
+              <a:rPr lang="en-US" i="1" dirty="0" smtClean="0"/>
+              <a:t>RATIO</a:t>
+            </a:r>
+            <a:endParaRPr lang="en-US" dirty="0" smtClean="0"/>
+          </a:p>
+          <a:p>
+            <a:r>
+              <a:rPr lang="en-US" dirty="0" err="1" smtClean="0"/>
+              <a:t>Darstellung</a:t>
+            </a:r>
+            <a:r>
+              <a:rPr lang="en-US" dirty="0" smtClean="0"/>
+              <a:t> </a:t>
+            </a:r>
+            <a:r>
+              <a:rPr lang="en-US" dirty="0" err="1" smtClean="0"/>
+              <a:t>als</a:t>
+            </a:r>
+            <a:r>
+              <a:rPr lang="en-US" dirty="0" smtClean="0"/>
+              <a:t> </a:t>
+            </a:r>
+            <a:r>
+              <a:rPr lang="en-US" dirty="0" err="1" smtClean="0"/>
+              <a:t>Brüche</a:t>
+            </a:r>
+            <a:r>
+              <a:rPr lang="en-US" dirty="0" smtClean="0"/>
+              <a:t> </a:t>
+            </a:r>
+            <a:r>
+              <a:rPr lang="en-US" dirty="0" err="1" smtClean="0"/>
+              <a:t>mit</a:t>
+            </a:r>
+            <a:r>
+              <a:rPr lang="en-US" dirty="0" smtClean="0"/>
+              <a:t> </a:t>
+            </a:r>
+            <a:r>
+              <a:rPr lang="en-US" dirty="0" err="1" smtClean="0"/>
+              <a:t>Zähler</a:t>
+            </a:r>
+            <a:r>
+              <a:rPr lang="en-US" dirty="0" smtClean="0"/>
+              <a:t> und </a:t>
+            </a:r>
+            <a:r>
+              <a:rPr lang="en-US" dirty="0" err="1" smtClean="0"/>
+              <a:t>Nenner</a:t>
+            </a:r>
+            <a:endParaRPr lang="en-US" dirty="0" smtClean="0"/>
+          </a:p>
+          <a:p>
+            <a:r>
+              <a:rPr lang="en-US" dirty="0" err="1" smtClean="0"/>
+              <a:t>Zur</a:t>
+            </a:r>
+            <a:r>
+              <a:rPr lang="en-US" dirty="0" smtClean="0"/>
+              <a:t> </a:t>
+            </a:r>
+            <a:r>
+              <a:rPr lang="en-US" dirty="0" err="1" smtClean="0"/>
+              <a:t>Laufzeit</a:t>
+            </a:r>
+            <a:r>
+              <a:rPr lang="en-US" dirty="0" smtClean="0"/>
+              <a:t> </a:t>
+            </a:r>
+            <a:r>
+              <a:rPr lang="en-US" dirty="0" err="1" smtClean="0"/>
+              <a:t>wird</a:t>
+            </a:r>
+            <a:r>
+              <a:rPr lang="en-US" dirty="0" smtClean="0"/>
+              <a:t> </a:t>
+            </a:r>
+            <a:r>
+              <a:rPr lang="en-US" dirty="0" err="1" smtClean="0"/>
+              <a:t>gekürzt</a:t>
+            </a:r>
+            <a:r>
+              <a:rPr lang="en-US" dirty="0" smtClean="0"/>
+              <a:t>, so </a:t>
+            </a:r>
+            <a:r>
+              <a:rPr lang="en-US" dirty="0" err="1" smtClean="0"/>
+              <a:t>dass</a:t>
+            </a:r>
+            <a:r>
+              <a:rPr lang="en-US" dirty="0" smtClean="0"/>
+              <a:t> </a:t>
+            </a:r>
+            <a:r>
+              <a:rPr lang="en-US" dirty="0" err="1" smtClean="0"/>
+              <a:t>Zähler</a:t>
+            </a:r>
+            <a:r>
+              <a:rPr lang="en-US" dirty="0" smtClean="0"/>
+              <a:t> und </a:t>
+            </a:r>
+            <a:r>
+              <a:rPr lang="en-US" dirty="0" err="1" smtClean="0"/>
+              <a:t>Nenner</a:t>
+            </a:r>
+            <a:r>
+              <a:rPr lang="en-US" dirty="0" smtClean="0"/>
+              <a:t> </a:t>
+            </a:r>
+            <a:r>
+              <a:rPr lang="en-US" dirty="0" err="1" smtClean="0"/>
+              <a:t>keine</a:t>
+            </a:r>
+            <a:r>
+              <a:rPr lang="en-US" dirty="0" smtClean="0"/>
+              <a:t> </a:t>
+            </a:r>
+            <a:r>
+              <a:rPr lang="en-US" dirty="0" err="1" smtClean="0"/>
+              <a:t>gemeinsamen</a:t>
+            </a:r>
+            <a:r>
+              <a:rPr lang="en-US" dirty="0" smtClean="0"/>
+              <a:t> </a:t>
+            </a:r>
+            <a:r>
+              <a:rPr lang="en-US" dirty="0" err="1" smtClean="0"/>
+              <a:t>positiven</a:t>
+            </a:r>
+            <a:r>
+              <a:rPr lang="en-US" dirty="0" smtClean="0"/>
+              <a:t> </a:t>
+            </a:r>
+            <a:r>
+              <a:rPr lang="en-US" dirty="0" err="1" smtClean="0"/>
+              <a:t>Teiler</a:t>
+            </a:r>
+            <a:r>
+              <a:rPr lang="en-US" dirty="0" smtClean="0"/>
+              <a:t> </a:t>
+            </a:r>
+            <a:r>
+              <a:rPr lang="en-US" dirty="0" err="1" smtClean="0"/>
+              <a:t>ausser</a:t>
+            </a:r>
+            <a:r>
+              <a:rPr lang="en-US" dirty="0" smtClean="0"/>
+              <a:t> 1 </a:t>
+            </a:r>
+            <a:r>
+              <a:rPr lang="en-US" dirty="0" err="1" smtClean="0"/>
+              <a:t>besitzen</a:t>
+            </a:r>
+            <a:r>
+              <a:rPr lang="en-US" dirty="0" smtClean="0"/>
+              <a:t>.</a:t>
+            </a:r>
+          </a:p>
+          <a:p>
+            <a:endParaRPr lang="en-US" dirty="0"/>
+          </a:p>
+        </p:txBody>
+      </p:sp>
+      <p:sp>
+        <p:nvSpPr>
+          <p:cNvPr id="2" name="Title 1"/>
+          <p:cNvSpPr>
+            <a:spLocks noGrp="1"/>
+          </p:cNvSpPr>
+          <p:nvPr>
+            <p:ph type="title"/>
+          </p:nvPr>
+        </p:nvSpPr>
+        <p:spPr/>
+        <p:txBody>
+          <a:bodyPr>
+            <a:normAutofit/>
+          </a:bodyPr>
+          <a:lstStyle/>
+          <a:p>
+            <a:r>
+              <a:rPr lang="en-US" dirty="0" err="1" smtClean="0"/>
+              <a:t>Idee</a:t>
+            </a:r>
+            <a:endParaRPr lang="en-US" dirty="0"/>
+          </a:p>
+        </p:txBody>
+      </p:sp>
+    </p:spTree>
+    <p:extLst>
+      <p:ext uri="{BB962C8B-B14F-4D97-AF65-F5344CB8AC3E}">
+        <p14:creationId xmlns:p14="http://schemas.microsoft.com/office/powerpoint/2010/main" val="1851896080"/>
+      </p:ext>
+    </p:extLst>
+  </p:cSld>
+  <p:clrMapOvr>
+    <a:masterClrMapping/>
+  </p:clrMapOvr>
+  <mc:AlternateContent xmlns:mc="http://schemas.openxmlformats.org/markup-compatibility/2006" xmlns:p14="http://schemas.microsoft.com/office/powerpoint/2010/main">
+    <mc:Choice Requires="p14">
+      <p:transition spd="med" p14:dur="700">
+        <p:fade/>
+      </p:transition>
+    </mc:Choice>
+    <mc:Fallback xmlns="">
+      <p:transition spd="med">
+        <p:fade/>
+      </p:transition>
+    </mc:Fallback>
+  </mc:AlternateContent>
+</p:sld>
+</file>
+
+<file path=ppt/slides/slide3.xml><?xml version="1.0" encoding="utf-8"?>
+<p:sld xmlns:a="http://schemas.openxmlformats.org/drawingml/2006/main" xmlns:r="http://schemas.openxmlformats.org/officeDocument/2006/relationships" xmlns:p="http://schemas.openxmlformats.org/presentationml/2006/main">
+  <p:cSld>
+    <p:spTree>
+      <p:nvGrpSpPr>
+        <p:cNvPr id="1" name=""/>
+        <p:cNvGrpSpPr/>
+        <p:nvPr/>
+      </p:nvGrpSpPr>
+      <p:grpSpPr>
+        <a:xfrm>
+          <a:off x="0" y="0"/>
+          <a:ext cx="0" cy="0"/>
+          <a:chOff x="0" y="0"/>
+          <a:chExt cx="0" cy="0"/>
+        </a:xfrm>
+      </p:grpSpPr>
+      <p:sp>
+        <p:nvSpPr>
+          <p:cNvPr id="3" name="Content Placeholder 2"/>
+          <p:cNvSpPr>
+            <a:spLocks noGrp="1"/>
+          </p:cNvSpPr>
+          <p:nvPr>
+            <p:ph idx="1"/>
+          </p:nvPr>
+        </p:nvSpPr>
+        <p:spPr/>
+        <p:txBody>
+          <a:bodyPr/>
+          <a:lstStyle/>
+          <a:p>
+            <a:r>
+              <a:rPr lang="en-US" dirty="0" smtClean="0"/>
+              <a:t>Pattern</a:t>
+            </a:r>
+          </a:p>
+          <a:p>
+            <a:pPr marL="411480" lvl="1" indent="0">
+              <a:buNone/>
+            </a:pPr>
+            <a:r>
+              <a:rPr lang="en-GB" dirty="0">
+                <a:latin typeface="Consolas" panose="020B0609020204030204" pitchFamily="49" charset="0"/>
+                <a:cs typeface="Consolas" panose="020B0609020204030204" pitchFamily="49" charset="0"/>
+              </a:rPr>
+              <a:t>[0-9]+(‘*[0-9]+)*/[1-9]+(‘*[0-9</a:t>
+            </a:r>
+            <a:r>
+              <a:rPr lang="en-GB" dirty="0" smtClean="0">
+                <a:latin typeface="Consolas" panose="020B0609020204030204" pitchFamily="49" charset="0"/>
+                <a:cs typeface="Consolas" panose="020B0609020204030204" pitchFamily="49" charset="0"/>
+              </a:rPr>
+              <a:t>]+)*</a:t>
+            </a:r>
+          </a:p>
+          <a:p>
+            <a:pPr marL="411480" lvl="1" indent="0">
+              <a:buNone/>
+            </a:pPr>
+            <a:endParaRPr lang="en-GB" dirty="0">
+              <a:latin typeface="Consolas" panose="020B0609020204030204" pitchFamily="49" charset="0"/>
+              <a:cs typeface="Consolas" panose="020B0609020204030204" pitchFamily="49" charset="0"/>
+            </a:endParaRPr>
+          </a:p>
+          <a:p>
+            <a:r>
+              <a:rPr lang="en-GB" dirty="0"/>
+              <a:t>Lexeme</a:t>
+            </a:r>
+          </a:p>
+          <a:p>
+            <a:pPr marL="411480" lvl="1" indent="0">
+              <a:buNone/>
+            </a:pPr>
+            <a:r>
+              <a:rPr lang="en-GB" dirty="0" smtClean="0">
+                <a:latin typeface="Consolas" panose="020B0609020204030204" pitchFamily="49" charset="0"/>
+                <a:cs typeface="Consolas" panose="020B0609020204030204" pitchFamily="49" charset="0"/>
+              </a:rPr>
+              <a:t>1’337/42  -&gt; 191 / 6</a:t>
+            </a:r>
+          </a:p>
+          <a:p>
+            <a:pPr marL="411480" lvl="1" indent="0">
+              <a:buNone/>
+            </a:pPr>
+            <a:endParaRPr lang="en-GB" dirty="0" smtClean="0">
+              <a:latin typeface="Consolas" panose="020B0609020204030204" pitchFamily="49" charset="0"/>
+              <a:cs typeface="Consolas" panose="020B0609020204030204" pitchFamily="49" charset="0"/>
+            </a:endParaRPr>
+          </a:p>
+          <a:p>
+            <a:r>
+              <a:rPr lang="en-GB" dirty="0" err="1"/>
+              <a:t>Neues</a:t>
+            </a:r>
+            <a:r>
+              <a:rPr lang="en-GB" dirty="0"/>
+              <a:t> </a:t>
+            </a:r>
+            <a:r>
+              <a:rPr lang="en-GB" dirty="0" err="1"/>
+              <a:t>Attribut</a:t>
+            </a:r>
+            <a:r>
+              <a:rPr lang="en-GB" dirty="0"/>
+              <a:t> </a:t>
+            </a:r>
+            <a:r>
+              <a:rPr lang="en-GB" dirty="0" err="1"/>
+              <a:t>für</a:t>
+            </a:r>
+            <a:r>
+              <a:rPr lang="en-GB" dirty="0"/>
+              <a:t> </a:t>
+            </a:r>
+            <a:r>
+              <a:rPr lang="en-GB" dirty="0" smtClean="0"/>
+              <a:t>LITERAL-Token: </a:t>
+            </a:r>
+            <a:r>
+              <a:rPr lang="en-GB" dirty="0" err="1"/>
+              <a:t>RatioVal</a:t>
+            </a:r>
+            <a:r>
+              <a:rPr lang="en-GB" dirty="0"/>
+              <a:t> </a:t>
+            </a:r>
+            <a:r>
+              <a:rPr lang="en-GB" dirty="0" err="1" smtClean="0"/>
+              <a:t>Int</a:t>
+            </a:r>
+            <a:r>
+              <a:rPr lang="en-GB" dirty="0" smtClean="0"/>
+              <a:t> </a:t>
+            </a:r>
+            <a:r>
+              <a:rPr lang="en-GB" dirty="0" err="1" smtClean="0"/>
+              <a:t>Int</a:t>
+            </a:r>
+            <a:r>
+              <a:rPr lang="en-GB" dirty="0"/>
+              <a:t/>
+            </a:r>
+            <a:br>
+              <a:rPr lang="en-GB" dirty="0"/>
+            </a:br>
+            <a:endParaRPr lang="en-US" dirty="0"/>
+          </a:p>
+        </p:txBody>
+      </p:sp>
+      <p:sp>
+        <p:nvSpPr>
+          <p:cNvPr id="2" name="Title 1"/>
+          <p:cNvSpPr>
+            <a:spLocks noGrp="1"/>
+          </p:cNvSpPr>
+          <p:nvPr>
+            <p:ph type="title"/>
+          </p:nvPr>
+        </p:nvSpPr>
+        <p:spPr/>
+        <p:txBody>
+          <a:bodyPr/>
+          <a:lstStyle/>
+          <a:p>
+            <a:r>
+              <a:rPr lang="en-US" dirty="0" err="1" smtClean="0"/>
+              <a:t>Lexikalische</a:t>
+            </a:r>
+            <a:r>
+              <a:rPr lang="en-US" dirty="0" smtClean="0"/>
+              <a:t> Syntax</a:t>
+            </a:r>
+            <a:endParaRPr lang="en-US" dirty="0"/>
+          </a:p>
+        </p:txBody>
+      </p:sp>
+    </p:spTree>
+    <p:extLst>
+      <p:ext uri="{BB962C8B-B14F-4D97-AF65-F5344CB8AC3E}">
+        <p14:creationId xmlns:p14="http://schemas.microsoft.com/office/powerpoint/2010/main" val="997860157"/>
+      </p:ext>
+    </p:extLst>
+  </p:cSld>
+  <p:clrMapOvr>
+    <a:masterClrMapping/>
+  </p:clrMapOvr>
+  <mc:AlternateContent xmlns:mc="http://schemas.openxmlformats.org/markup-compatibility/2006" xmlns:p14="http://schemas.microsoft.com/office/powerpoint/2010/main">
+    <mc:Choice Requires="p14">
+      <p:transition spd="med" p14:dur="700">
+        <p:fade/>
+      </p:transition>
+    </mc:Choice>
+    <mc:Fallback xmlns="">
+      <p:transition spd="med">
+        <p:fade/>
+      </p:transition>
+    </mc:Fallback>
+  </mc:AlternateContent>
+</p:sld>
+</file>
+
+<file path=ppt/slides/slide4.xml><?xml version="1.0" encoding="utf-8"?>
+<p:sld xmlns:a="http://schemas.openxmlformats.org/drawingml/2006/main" xmlns:r="http://schemas.openxmlformats.org/officeDocument/2006/relationships" xmlns:p="http://schemas.openxmlformats.org/presentationml/2006/main">
+  <p:cSld>
+    <p:spTree>
+      <p:nvGrpSpPr>
+        <p:cNvPr id="1" name=""/>
+        <p:cNvGrpSpPr/>
+        <p:nvPr/>
+      </p:nvGrpSpPr>
+      <p:grpSpPr>
+        <a:xfrm>
+          <a:off x="0" y="0"/>
+          <a:ext cx="0" cy="0"/>
+          <a:chOff x="0" y="0"/>
+          <a:chExt cx="0" cy="0"/>
+        </a:xfrm>
+      </p:grpSpPr>
+      <p:sp>
+        <p:nvSpPr>
+          <p:cNvPr id="2" name="Content Placeholder 1"/>
+          <p:cNvSpPr>
+            <a:spLocks noGrp="1"/>
+          </p:cNvSpPr>
+          <p:nvPr>
+            <p:ph idx="1"/>
+          </p:nvPr>
+        </p:nvSpPr>
+        <p:spPr/>
+        <p:txBody>
+          <a:bodyPr/>
+          <a:lstStyle/>
+          <a:p>
+            <a:r>
+              <a:rPr lang="en-GB" dirty="0" err="1" smtClean="0"/>
+              <a:t>Neue</a:t>
+            </a:r>
+            <a:r>
+              <a:rPr lang="en-GB" dirty="0" smtClean="0"/>
+              <a:t> </a:t>
+            </a:r>
+            <a:r>
+              <a:rPr lang="en-GB" dirty="0" err="1" smtClean="0"/>
+              <a:t>Schlüsselwörter</a:t>
+            </a:r>
+            <a:endParaRPr lang="en-GB" dirty="0" smtClean="0"/>
+          </a:p>
+          <a:p>
+            <a:endParaRPr lang="en-GB" dirty="0"/>
+          </a:p>
+          <a:p>
+            <a:r>
+              <a:rPr lang="en-GB" dirty="0"/>
+              <a:t>r</a:t>
+            </a:r>
+            <a:r>
+              <a:rPr lang="en-GB" dirty="0" smtClean="0"/>
+              <a:t>atio: </a:t>
+            </a:r>
+            <a:r>
+              <a:rPr lang="en-GB" dirty="0" err="1" smtClean="0"/>
+              <a:t>Deklaration</a:t>
+            </a:r>
+            <a:endParaRPr lang="en-GB" dirty="0" smtClean="0"/>
+          </a:p>
+          <a:p>
+            <a:r>
+              <a:rPr lang="en-GB" dirty="0" err="1"/>
+              <a:t>n</a:t>
+            </a:r>
+            <a:r>
+              <a:rPr lang="en-GB" dirty="0" err="1" smtClean="0"/>
+              <a:t>um</a:t>
+            </a:r>
+            <a:r>
+              <a:rPr lang="en-GB" dirty="0" smtClean="0"/>
+              <a:t>: </a:t>
+            </a:r>
+            <a:r>
+              <a:rPr lang="en-GB" dirty="0" err="1" smtClean="0"/>
+              <a:t>Zähler</a:t>
+            </a:r>
+            <a:r>
+              <a:rPr lang="en-GB" dirty="0" smtClean="0"/>
+              <a:t> </a:t>
+            </a:r>
+            <a:r>
+              <a:rPr lang="en-GB" dirty="0" err="1" smtClean="0"/>
+              <a:t>auslesen</a:t>
+            </a:r>
+            <a:endParaRPr lang="en-GB" dirty="0" smtClean="0"/>
+          </a:p>
+          <a:p>
+            <a:r>
+              <a:rPr lang="en-GB" dirty="0" err="1"/>
+              <a:t>d</a:t>
+            </a:r>
+            <a:r>
+              <a:rPr lang="en-GB" dirty="0" err="1" smtClean="0"/>
+              <a:t>enom</a:t>
+            </a:r>
+            <a:r>
+              <a:rPr lang="en-GB" dirty="0" smtClean="0"/>
+              <a:t>: </a:t>
+            </a:r>
+            <a:r>
+              <a:rPr lang="en-GB" dirty="0" err="1" smtClean="0"/>
+              <a:t>Nenner</a:t>
+            </a:r>
+            <a:r>
+              <a:rPr lang="en-GB" dirty="0" smtClean="0"/>
+              <a:t> </a:t>
+            </a:r>
+            <a:r>
+              <a:rPr lang="en-GB" dirty="0" err="1" smtClean="0"/>
+              <a:t>auslesen</a:t>
+            </a:r>
+            <a:endParaRPr lang="en-GB" dirty="0" smtClean="0"/>
+          </a:p>
+          <a:p>
+            <a:r>
+              <a:rPr lang="en-GB" dirty="0"/>
+              <a:t>f</a:t>
+            </a:r>
+            <a:r>
+              <a:rPr lang="en-GB" dirty="0" smtClean="0"/>
+              <a:t>loor: </a:t>
+            </a:r>
+            <a:r>
+              <a:rPr lang="en-GB" dirty="0" err="1" smtClean="0"/>
+              <a:t>Abrunden</a:t>
+            </a:r>
+            <a:endParaRPr lang="en-GB" dirty="0" smtClean="0"/>
+          </a:p>
+          <a:p>
+            <a:r>
+              <a:rPr lang="en-GB" dirty="0"/>
+              <a:t>c</a:t>
+            </a:r>
+            <a:r>
+              <a:rPr lang="en-GB" dirty="0" smtClean="0"/>
+              <a:t>eil: </a:t>
+            </a:r>
+            <a:r>
+              <a:rPr lang="en-GB" dirty="0" err="1" smtClean="0"/>
+              <a:t>Aufrunden</a:t>
+            </a:r>
+            <a:endParaRPr lang="en-GB" dirty="0" smtClean="0"/>
+          </a:p>
+          <a:p>
+            <a:r>
+              <a:rPr lang="en-GB" dirty="0"/>
+              <a:t>r</a:t>
+            </a:r>
+            <a:r>
+              <a:rPr lang="en-GB" dirty="0" smtClean="0"/>
+              <a:t>ound: </a:t>
+            </a:r>
+            <a:r>
+              <a:rPr lang="en-GB" dirty="0" err="1" smtClean="0"/>
+              <a:t>Runden</a:t>
+            </a:r>
+            <a:endParaRPr lang="en-GB" dirty="0" smtClean="0"/>
+          </a:p>
+          <a:p>
+            <a:r>
+              <a:rPr lang="en-GB" dirty="0" err="1" smtClean="0"/>
+              <a:t>asRatio</a:t>
+            </a:r>
+            <a:r>
+              <a:rPr lang="en-GB" dirty="0" smtClean="0"/>
+              <a:t>: Integer </a:t>
+            </a:r>
+            <a:r>
+              <a:rPr lang="en-GB" dirty="0" err="1" smtClean="0"/>
+              <a:t>als</a:t>
+            </a:r>
+            <a:r>
+              <a:rPr lang="en-GB" dirty="0" smtClean="0"/>
+              <a:t> rationale </a:t>
+            </a:r>
+            <a:r>
+              <a:rPr lang="en-GB" dirty="0" err="1" smtClean="0"/>
+              <a:t>Zahl</a:t>
+            </a:r>
+            <a:r>
+              <a:rPr lang="en-GB" dirty="0" smtClean="0"/>
+              <a:t> </a:t>
+            </a:r>
+            <a:r>
+              <a:rPr lang="en-GB" dirty="0" err="1" smtClean="0"/>
+              <a:t>behandeln</a:t>
+            </a:r>
+            <a:endParaRPr lang="en-GB" dirty="0"/>
+          </a:p>
+        </p:txBody>
+      </p:sp>
+      <p:sp>
+        <p:nvSpPr>
+          <p:cNvPr id="3" name="Title 2"/>
+          <p:cNvSpPr>
+            <a:spLocks noGrp="1"/>
+          </p:cNvSpPr>
+          <p:nvPr>
+            <p:ph type="title"/>
+          </p:nvPr>
+        </p:nvSpPr>
+        <p:spPr/>
+        <p:txBody>
+          <a:bodyPr/>
+          <a:lstStyle/>
+          <a:p>
+            <a:r>
+              <a:rPr lang="en-US" dirty="0" err="1"/>
+              <a:t>Lexikalische</a:t>
+            </a:r>
+            <a:r>
+              <a:rPr lang="en-US" dirty="0"/>
+              <a:t> Syntax</a:t>
+            </a:r>
+            <a:endParaRPr lang="en-GB" dirty="0"/>
+          </a:p>
+        </p:txBody>
+      </p:sp>
+      <p:sp>
+        <p:nvSpPr>
+          <p:cNvPr id="4" name="TextBox 3"/>
+          <p:cNvSpPr txBox="1"/>
+          <p:nvPr/>
+        </p:nvSpPr>
+        <p:spPr>
+          <a:xfrm>
+            <a:off x="4465320" y="4016120"/>
+            <a:ext cx="7117080" cy="1446550"/>
+          </a:xfrm>
+          <a:prstGeom prst="rect">
+            <a:avLst/>
+          </a:prstGeom>
+          <a:noFill/>
+        </p:spPr>
+        <p:txBody>
+          <a:bodyPr wrap="square" rtlCol="0">
+            <a:spAutoFit/>
+          </a:bodyPr>
+          <a:lstStyle/>
+          <a:p>
+            <a:r>
+              <a:rPr lang="en-GB" sz="8800" dirty="0" smtClean="0">
+                <a:solidFill>
+                  <a:schemeClr val="tx2"/>
+                </a:solidFill>
+                <a:latin typeface="Javanese Text" panose="02000000000000000000" pitchFamily="2" charset="0"/>
+              </a:rPr>
+              <a:t>}</a:t>
+            </a:r>
+            <a:endParaRPr lang="en-GB" sz="2800" dirty="0">
+              <a:solidFill>
+                <a:schemeClr val="tx2"/>
+              </a:solidFill>
+              <a:latin typeface="Javanese Text" panose="02000000000000000000" pitchFamily="2" charset="0"/>
+            </a:endParaRPr>
+          </a:p>
+        </p:txBody>
+      </p:sp>
+      <p:sp>
+        <p:nvSpPr>
+          <p:cNvPr id="5" name="TextBox 4"/>
+          <p:cNvSpPr txBox="1"/>
+          <p:nvPr/>
+        </p:nvSpPr>
+        <p:spPr>
+          <a:xfrm>
+            <a:off x="5098882" y="4539100"/>
+            <a:ext cx="3394252" cy="523220"/>
+          </a:xfrm>
+          <a:prstGeom prst="rect">
+            <a:avLst/>
+          </a:prstGeom>
+          <a:noFill/>
+        </p:spPr>
+        <p:txBody>
+          <a:bodyPr wrap="square" rtlCol="0">
+            <a:spAutoFit/>
+          </a:bodyPr>
+          <a:lstStyle/>
+          <a:p>
+            <a:r>
+              <a:rPr lang="en-GB" sz="2800" dirty="0">
+                <a:solidFill>
+                  <a:schemeClr val="tx2"/>
+                </a:solidFill>
+              </a:rPr>
+              <a:t>RATIOOPR</a:t>
+            </a:r>
+          </a:p>
+        </p:txBody>
+      </p:sp>
+    </p:spTree>
+    <p:extLst>
+      <p:ext uri="{BB962C8B-B14F-4D97-AF65-F5344CB8AC3E}">
+        <p14:creationId xmlns:p14="http://schemas.microsoft.com/office/powerpoint/2010/main" val="4274827622"/>
+      </p:ext>
+    </p:extLst>
+  </p:cSld>
+  <p:clrMapOvr>
+    <a:masterClrMapping/>
+  </p:clrMapOvr>
+  <mc:AlternateContent xmlns:mc="http://schemas.openxmlformats.org/markup-compatibility/2006" xmlns:p14="http://schemas.microsoft.com/office/powerpoint/2010/main">
+    <mc:Choice Requires="p14">
+      <p:transition spd="med" p14:dur="700">
+        <p:fade/>
+      </p:transition>
+    </mc:Choice>
+    <mc:Fallback xmlns="">
+      <p:transition spd="med">
+        <p:fade/>
+      </p:transition>
+    </mc:Fallback>
+  </mc:AlternateContent>
+</p:sld>
+</file>
+
+<file path=ppt/slides/slide5.xml><?xml version="1.0" encoding="utf-8"?>
+<p:sld xmlns:a="http://schemas.openxmlformats.org/drawingml/2006/main" xmlns:r="http://schemas.openxmlformats.org/officeDocument/2006/relationships" xmlns:p="http://schemas.openxmlformats.org/presentationml/2006/main">
+  <p:cSld>
+    <p:spTree>
+      <p:nvGrpSpPr>
+        <p:cNvPr id="1" name=""/>
+        <p:cNvGrpSpPr/>
+        <p:nvPr/>
+      </p:nvGrpSpPr>
+      <p:grpSpPr>
+        <a:xfrm>
+          <a:off x="0" y="0"/>
+          <a:ext cx="0" cy="0"/>
+          <a:chOff x="0" y="0"/>
+          <a:chExt cx="0" cy="0"/>
+        </a:xfrm>
+      </p:grpSpPr>
+      <p:sp>
+        <p:nvSpPr>
+          <p:cNvPr id="3" name="Content Placeholder 2"/>
+          <p:cNvSpPr>
+            <a:spLocks noGrp="1"/>
+          </p:cNvSpPr>
+          <p:nvPr>
+            <p:ph idx="1"/>
+          </p:nvPr>
+        </p:nvSpPr>
+        <p:spPr/>
+        <p:txBody>
+          <a:bodyPr/>
+          <a:lstStyle/>
+          <a:p>
+            <a:r>
+              <a:rPr lang="en-US" dirty="0" err="1" smtClean="0"/>
+              <a:t>Erweiterung</a:t>
+            </a:r>
+            <a:r>
+              <a:rPr lang="en-US" dirty="0" smtClean="0"/>
+              <a:t> der Grammatik um die </a:t>
+            </a:r>
+            <a:r>
+              <a:rPr lang="en-US" dirty="0" err="1" smtClean="0"/>
+              <a:t>folgende</a:t>
+            </a:r>
+            <a:r>
+              <a:rPr lang="en-US" dirty="0" smtClean="0"/>
+              <a:t> Regel:</a:t>
+            </a:r>
+          </a:p>
+          <a:p>
+            <a:pPr lvl="1"/>
+            <a:endParaRPr lang="en-US" dirty="0"/>
+          </a:p>
+          <a:p>
+            <a:pPr marL="411480" lvl="1" indent="0">
+              <a:buNone/>
+            </a:pPr>
+            <a:r>
+              <a:rPr lang="en-US" dirty="0" err="1" smtClean="0"/>
+              <a:t>monadicOpr</a:t>
+            </a:r>
+            <a:r>
+              <a:rPr lang="en-US" dirty="0" smtClean="0"/>
+              <a:t> ::= RATIOOPR | </a:t>
+            </a:r>
+            <a:r>
+              <a:rPr lang="en-US" dirty="0" err="1" smtClean="0"/>
+              <a:t>asRatio</a:t>
+            </a:r>
+            <a:endParaRPr lang="en-US" dirty="0" smtClean="0"/>
+          </a:p>
+          <a:p>
+            <a:pPr marL="411480" lvl="1" indent="0">
+              <a:buNone/>
+            </a:pPr>
+            <a:endParaRPr lang="en-US" dirty="0"/>
+          </a:p>
+          <a:p>
+            <a:r>
+              <a:rPr lang="en-US" dirty="0" err="1" smtClean="0"/>
+              <a:t>Präzedenz</a:t>
+            </a:r>
+            <a:r>
+              <a:rPr lang="en-US" dirty="0" smtClean="0"/>
+              <a:t> </a:t>
+            </a:r>
+            <a:r>
+              <a:rPr lang="en-US" dirty="0" err="1" smtClean="0"/>
+              <a:t>wie</a:t>
+            </a:r>
+            <a:r>
+              <a:rPr lang="en-US" dirty="0" smtClean="0"/>
+              <a:t> </a:t>
+            </a:r>
+            <a:r>
+              <a:rPr lang="en-US" dirty="0" err="1" smtClean="0"/>
+              <a:t>andere</a:t>
+            </a:r>
+            <a:r>
+              <a:rPr lang="en-US" dirty="0" smtClean="0"/>
+              <a:t> </a:t>
+            </a:r>
+            <a:r>
+              <a:rPr lang="en-US" dirty="0" err="1" smtClean="0"/>
+              <a:t>monadische</a:t>
+            </a:r>
+            <a:r>
+              <a:rPr lang="en-US" dirty="0" smtClean="0"/>
+              <a:t> </a:t>
+            </a:r>
+            <a:r>
+              <a:rPr lang="en-US" dirty="0" err="1" smtClean="0"/>
+              <a:t>Operatoren</a:t>
+            </a:r>
+            <a:r>
+              <a:rPr lang="en-US" dirty="0" smtClean="0"/>
+              <a:t> (NOT, +, -)</a:t>
+            </a:r>
+          </a:p>
+          <a:p>
+            <a:r>
+              <a:rPr lang="en-US" dirty="0" err="1" smtClean="0"/>
+              <a:t>Keine</a:t>
+            </a:r>
+            <a:r>
+              <a:rPr lang="en-US" dirty="0" smtClean="0"/>
+              <a:t> </a:t>
+            </a:r>
+            <a:r>
+              <a:rPr lang="en-GB" dirty="0"/>
+              <a:t>Assoziativität</a:t>
+            </a:r>
+            <a:br>
+              <a:rPr lang="en-GB" dirty="0"/>
+            </a:br>
+            <a:endParaRPr lang="en-US" dirty="0" smtClean="0"/>
+          </a:p>
+        </p:txBody>
+      </p:sp>
+      <p:sp>
+        <p:nvSpPr>
+          <p:cNvPr id="2" name="Title 1"/>
+          <p:cNvSpPr>
+            <a:spLocks noGrp="1"/>
+          </p:cNvSpPr>
+          <p:nvPr>
+            <p:ph type="title"/>
+          </p:nvPr>
+        </p:nvSpPr>
+        <p:spPr/>
+        <p:txBody>
+          <a:bodyPr/>
+          <a:lstStyle/>
+          <a:p>
+            <a:r>
+              <a:rPr lang="en-US" dirty="0" err="1" smtClean="0"/>
+              <a:t>Grammatikalische</a:t>
+            </a:r>
+            <a:r>
+              <a:rPr lang="en-US" dirty="0" smtClean="0"/>
+              <a:t> Syntax</a:t>
+            </a:r>
+            <a:endParaRPr lang="en-US" dirty="0"/>
+          </a:p>
+        </p:txBody>
+      </p:sp>
+    </p:spTree>
+    <p:extLst>
+      <p:ext uri="{BB962C8B-B14F-4D97-AF65-F5344CB8AC3E}">
+        <p14:creationId xmlns:p14="http://schemas.microsoft.com/office/powerpoint/2010/main" val="384888077"/>
+      </p:ext>
+    </p:extLst>
+  </p:cSld>
+  <p:clrMapOvr>
+    <a:masterClrMapping/>
+  </p:clrMapOvr>
+  <mc:AlternateContent xmlns:mc="http://schemas.openxmlformats.org/markup-compatibility/2006" xmlns:p14="http://schemas.microsoft.com/office/powerpoint/2010/main">
+    <mc:Choice Requires="p14">
+      <p:transition spd="med" p14:dur="700">
+        <p:fade/>
+      </p:transition>
+    </mc:Choice>
+    <mc:Fallback xmlns="">
+      <p:transition spd="med">
+        <p:fade/>
+      </p:transition>
+    </mc:Fallback>
+  </mc:AlternateContent>
+</p:sld>
+</file>
+
+<file path=ppt/slides/slide6.xml><?xml version="1.0" encoding="utf-8"?>
+<p:sld xmlns:a="http://schemas.openxmlformats.org/drawingml/2006/main" xmlns:r="http://schemas.openxmlformats.org/officeDocument/2006/relationships" xmlns:p="http://schemas.openxmlformats.org/presentationml/2006/main">
+  <p:cSld>
+    <p:spTree>
+      <p:nvGrpSpPr>
+        <p:cNvPr id="1" name=""/>
+        <p:cNvGrpSpPr/>
+        <p:nvPr/>
+      </p:nvGrpSpPr>
+      <p:grpSpPr>
+        <a:xfrm>
+          <a:off x="0" y="0"/>
+          <a:ext cx="0" cy="0"/>
+          <a:chOff x="0" y="0"/>
+          <a:chExt cx="0" cy="0"/>
+        </a:xfrm>
+      </p:grpSpPr>
+      <p:sp>
+        <p:nvSpPr>
+          <p:cNvPr id="3" name="Content Placeholder 2"/>
+          <p:cNvSpPr>
+            <a:spLocks noGrp="1"/>
+          </p:cNvSpPr>
+          <p:nvPr>
+            <p:ph idx="1"/>
+          </p:nvPr>
+        </p:nvSpPr>
+        <p:spPr/>
+        <p:txBody>
+          <a:bodyPr/>
+          <a:lstStyle/>
+          <a:p>
+            <a:r>
+              <a:rPr lang="en-US" dirty="0" smtClean="0"/>
+              <a:t>RATIOOPR </a:t>
+            </a:r>
+            <a:r>
+              <a:rPr lang="en-US" dirty="0" err="1" smtClean="0"/>
+              <a:t>unterstützen</a:t>
+            </a:r>
+            <a:r>
+              <a:rPr lang="en-US" dirty="0" smtClean="0"/>
+              <a:t> </a:t>
+            </a:r>
+            <a:r>
+              <a:rPr lang="en-US" dirty="0" err="1" smtClean="0"/>
+              <a:t>als</a:t>
+            </a:r>
+            <a:r>
+              <a:rPr lang="en-US" dirty="0" smtClean="0"/>
+              <a:t> Argument </a:t>
+            </a:r>
+            <a:r>
+              <a:rPr lang="en-US" dirty="0" err="1" smtClean="0"/>
+              <a:t>nur</a:t>
+            </a:r>
+            <a:r>
+              <a:rPr lang="en-US" dirty="0" smtClean="0"/>
+              <a:t> </a:t>
+            </a:r>
+            <a:r>
+              <a:rPr lang="en-US" dirty="0" err="1" smtClean="0"/>
+              <a:t>RatioVal</a:t>
+            </a:r>
+            <a:endParaRPr lang="en-US" dirty="0"/>
+          </a:p>
+          <a:p>
+            <a:r>
+              <a:rPr lang="en-US" dirty="0" err="1" smtClean="0"/>
+              <a:t>Für</a:t>
+            </a:r>
+            <a:r>
+              <a:rPr lang="en-US" dirty="0" smtClean="0"/>
+              <a:t> MULTOPR, ADDOPR und RELOPR</a:t>
+            </a:r>
+          </a:p>
+          <a:p>
+            <a:pPr lvl="1"/>
+            <a:r>
+              <a:rPr lang="en-US" dirty="0" smtClean="0"/>
+              <a:t>Integer-</a:t>
+            </a:r>
+            <a:r>
+              <a:rPr lang="en-US" dirty="0" err="1" smtClean="0"/>
+              <a:t>Argumente</a:t>
+            </a:r>
+            <a:r>
+              <a:rPr lang="en-US" dirty="0" smtClean="0"/>
+              <a:t> </a:t>
+            </a:r>
+            <a:r>
+              <a:rPr lang="en-US" dirty="0" err="1" smtClean="0"/>
+              <a:t>werden</a:t>
+            </a:r>
+            <a:r>
+              <a:rPr lang="en-US" dirty="0" smtClean="0"/>
+              <a:t> in </a:t>
+            </a:r>
+            <a:r>
+              <a:rPr lang="en-US" dirty="0" err="1" smtClean="0"/>
+              <a:t>RatioVal</a:t>
+            </a:r>
+            <a:r>
+              <a:rPr lang="en-US" dirty="0" smtClean="0"/>
+              <a:t> </a:t>
+            </a:r>
+            <a:r>
+              <a:rPr lang="en-US" dirty="0" err="1" smtClean="0"/>
+              <a:t>konvertiert</a:t>
+            </a:r>
+            <a:endParaRPr lang="en-US" dirty="0" smtClean="0"/>
+          </a:p>
+          <a:p>
+            <a:endParaRPr lang="en-US" dirty="0"/>
+          </a:p>
+        </p:txBody>
+      </p:sp>
+      <p:sp>
+        <p:nvSpPr>
+          <p:cNvPr id="2" name="Title 1"/>
+          <p:cNvSpPr>
+            <a:spLocks noGrp="1"/>
+          </p:cNvSpPr>
+          <p:nvPr>
+            <p:ph type="title"/>
+          </p:nvPr>
+        </p:nvSpPr>
+        <p:spPr/>
+        <p:txBody>
+          <a:bodyPr>
+            <a:normAutofit/>
+          </a:bodyPr>
+          <a:lstStyle/>
+          <a:p>
+            <a:r>
+              <a:rPr lang="en-US" dirty="0" err="1" smtClean="0"/>
+              <a:t>Einschränkungen</a:t>
+            </a:r>
+            <a:endParaRPr lang="en-US" dirty="0"/>
+          </a:p>
+        </p:txBody>
+      </p:sp>
+    </p:spTree>
+    <p:extLst>
+      <p:ext uri="{BB962C8B-B14F-4D97-AF65-F5344CB8AC3E}">
+        <p14:creationId xmlns:p14="http://schemas.microsoft.com/office/powerpoint/2010/main" val="3514341159"/>
+      </p:ext>
+    </p:extLst>
+  </p:cSld>
+  <p:clrMapOvr>
+    <a:masterClrMapping/>
+  </p:clrMapOvr>
+  <mc:AlternateContent xmlns:mc="http://schemas.openxmlformats.org/markup-compatibility/2006" xmlns:p14="http://schemas.microsoft.com/office/powerpoint/2010/main">
+    <mc:Choice Requires="p14">
+      <p:transition spd="med" p14:dur="700">
+        <p:fade/>
+      </p:transition>
+    </mc:Choice>
+    <mc:Fallback xmlns="">
+      <p:transition spd="med">
+        <p:fade/>
+      </p:transition>
+    </mc:Fallback>
+  </mc:AlternateContent>
+</p:sld>
+</file>
+
+<file path=ppt/slides/slide7.xml><?xml version="1.0" encoding="utf-8"?>
+<p:sld xmlns:a="http://schemas.openxmlformats.org/drawingml/2006/main" xmlns:r="http://schemas.openxmlformats.org/officeDocument/2006/relationships" xmlns:p="http://schemas.openxmlformats.org/presentationml/2006/main">
+  <p:cSld>
+    <p:spTree>
+      <p:nvGrpSpPr>
+        <p:cNvPr id="1" name=""/>
+        <p:cNvGrpSpPr/>
+        <p:nvPr/>
+      </p:nvGrpSpPr>
+      <p:grpSpPr>
+        <a:xfrm>
+          <a:off x="0" y="0"/>
+          <a:ext cx="0" cy="0"/>
+          <a:chOff x="0" y="0"/>
+          <a:chExt cx="0" cy="0"/>
+        </a:xfrm>
+      </p:grpSpPr>
+      <p:sp>
+        <p:nvSpPr>
+          <p:cNvPr id="2" name="Content Placeholder 1"/>
+          <p:cNvSpPr>
+            <a:spLocks noGrp="1"/>
+          </p:cNvSpPr>
+          <p:nvPr>
+            <p:ph idx="1"/>
+          </p:nvPr>
+        </p:nvSpPr>
+        <p:spPr/>
+        <p:txBody>
+          <a:bodyPr/>
+          <a:lstStyle/>
+          <a:p>
+            <a:r>
+              <a:rPr lang="en-GB" dirty="0" smtClean="0"/>
+              <a:t>Integer </a:t>
+            </a:r>
+            <a:r>
+              <a:rPr lang="en-GB" dirty="0" err="1" smtClean="0"/>
+              <a:t>zu</a:t>
+            </a:r>
+            <a:r>
+              <a:rPr lang="en-GB" dirty="0" smtClean="0"/>
+              <a:t> Ratio</a:t>
+            </a:r>
+          </a:p>
+          <a:p>
+            <a:r>
+              <a:rPr lang="en-GB" dirty="0" err="1" smtClean="0"/>
+              <a:t>Dyadische</a:t>
+            </a:r>
+            <a:r>
+              <a:rPr lang="en-GB" dirty="0" smtClean="0"/>
+              <a:t> Expressions</a:t>
+            </a:r>
+          </a:p>
+          <a:p>
+            <a:pPr lvl="1"/>
+            <a:r>
+              <a:rPr lang="en-GB" dirty="0" smtClean="0"/>
+              <a:t>Z.B. Addition von 5 + ½</a:t>
+            </a:r>
+          </a:p>
+          <a:p>
+            <a:pPr lvl="1"/>
+            <a:r>
+              <a:rPr lang="en-GB" dirty="0" err="1" smtClean="0"/>
+              <a:t>DyadicExpression</a:t>
+            </a:r>
+            <a:r>
+              <a:rPr lang="en-GB" dirty="0" smtClean="0"/>
+              <a:t> </a:t>
+            </a:r>
+            <a:br>
+              <a:rPr lang="en-GB" dirty="0" smtClean="0"/>
+            </a:br>
+            <a:r>
+              <a:rPr lang="en-GB" dirty="0" smtClean="0"/>
+              <a:t>	(Add, </a:t>
+            </a:r>
+            <a:br>
+              <a:rPr lang="en-GB" dirty="0" smtClean="0"/>
+            </a:br>
+            <a:r>
+              <a:rPr lang="en-GB" dirty="0" smtClean="0"/>
+              <a:t>		</a:t>
+            </a:r>
+            <a:r>
+              <a:rPr lang="en-GB" dirty="0" err="1" smtClean="0"/>
+              <a:t>LiteralRExpr</a:t>
+            </a:r>
+            <a:r>
+              <a:rPr lang="en-GB" dirty="0" smtClean="0"/>
+              <a:t> (</a:t>
+            </a:r>
+            <a:r>
+              <a:rPr lang="en-GB" dirty="0" err="1" smtClean="0"/>
+              <a:t>IntVal</a:t>
+            </a:r>
+            <a:r>
+              <a:rPr lang="en-GB" dirty="0" smtClean="0"/>
+              <a:t> 5, </a:t>
+            </a:r>
+            <a:r>
+              <a:rPr lang="en-GB" dirty="0" err="1" smtClean="0"/>
+              <a:t>IntType</a:t>
+            </a:r>
+            <a:r>
+              <a:rPr lang="en-GB" dirty="0" smtClean="0"/>
+              <a:t>), </a:t>
+            </a:r>
+            <a:br>
+              <a:rPr lang="en-GB" dirty="0" smtClean="0"/>
+            </a:br>
+            <a:r>
+              <a:rPr lang="en-GB" dirty="0" smtClean="0"/>
+              <a:t>		</a:t>
+            </a:r>
+            <a:r>
+              <a:rPr lang="en-GB" dirty="0" err="1" smtClean="0"/>
+              <a:t>LiteralRExpr</a:t>
+            </a:r>
+            <a:r>
+              <a:rPr lang="en-GB" dirty="0" smtClean="0"/>
+              <a:t> (</a:t>
+            </a:r>
+            <a:r>
+              <a:rPr lang="en-GB" dirty="0" err="1" smtClean="0"/>
+              <a:t>RatioVal</a:t>
+            </a:r>
+            <a:r>
+              <a:rPr lang="en-GB" dirty="0" smtClean="0"/>
+              <a:t> 1 2, </a:t>
+            </a:r>
+            <a:r>
+              <a:rPr lang="en-GB" dirty="0" err="1" smtClean="0"/>
+              <a:t>RatioType</a:t>
+            </a:r>
+            <a:r>
+              <a:rPr lang="en-GB" dirty="0"/>
+              <a:t>)</a:t>
+            </a:r>
+            <a:r>
+              <a:rPr lang="en-GB" dirty="0" smtClean="0"/>
+              <a:t>, </a:t>
+            </a:r>
+            <a:br>
+              <a:rPr lang="en-GB" dirty="0" smtClean="0"/>
+            </a:br>
+            <a:r>
+              <a:rPr lang="en-GB" dirty="0" smtClean="0"/>
+              <a:t>	 </a:t>
+            </a:r>
+            <a:r>
+              <a:rPr lang="en-GB" b="1" dirty="0" err="1" smtClean="0"/>
+              <a:t>RatioType</a:t>
+            </a:r>
+            <a:r>
+              <a:rPr lang="en-GB" dirty="0" smtClean="0"/>
+              <a:t>)</a:t>
+            </a:r>
+            <a:endParaRPr lang="en-GB" dirty="0"/>
+          </a:p>
+        </p:txBody>
+      </p:sp>
+      <p:sp>
+        <p:nvSpPr>
+          <p:cNvPr id="3" name="Title 2"/>
+          <p:cNvSpPr>
+            <a:spLocks noGrp="1"/>
+          </p:cNvSpPr>
+          <p:nvPr>
+            <p:ph type="title"/>
+          </p:nvPr>
+        </p:nvSpPr>
+        <p:spPr/>
+        <p:txBody>
+          <a:bodyPr/>
+          <a:lstStyle/>
+          <a:p>
+            <a:r>
+              <a:rPr lang="en-GB" dirty="0" err="1" smtClean="0"/>
+              <a:t>Implizite</a:t>
+            </a:r>
+            <a:r>
+              <a:rPr lang="en-GB" dirty="0" smtClean="0"/>
+              <a:t> </a:t>
+            </a:r>
+            <a:r>
+              <a:rPr lang="en-GB" dirty="0" err="1" smtClean="0"/>
+              <a:t>Typenkonvertierung</a:t>
+            </a:r>
+            <a:endParaRPr lang="en-GB" dirty="0"/>
+          </a:p>
+        </p:txBody>
+      </p:sp>
+    </p:spTree>
+    <p:extLst>
+      <p:ext uri="{BB962C8B-B14F-4D97-AF65-F5344CB8AC3E}">
+        <p14:creationId xmlns:p14="http://schemas.microsoft.com/office/powerpoint/2010/main" val="398266194"/>
+      </p:ext>
+    </p:extLst>
+  </p:cSld>
+  <p:clrMapOvr>
+    <a:masterClrMapping/>
+  </p:clrMapOvr>
+  <mc:AlternateContent xmlns:mc="http://schemas.openxmlformats.org/markup-compatibility/2006" xmlns:p14="http://schemas.microsoft.com/office/powerpoint/2010/main">
+    <mc:Choice Requires="p14">
+      <p:transition spd="med" p14:dur="700">
+        <p:fade/>
+      </p:transition>
+    </mc:Choice>
+    <mc:Fallback xmlns="">
+      <p:transition spd="med">
+        <p:fade/>
+      </p:transition>
+    </mc:Fallback>
+  </mc:AlternateContent>
+</p:sld>
+</file>
+
+<file path=ppt/slides/slide8.xml><?xml version="1.0" encoding="utf-8"?>
+<p:sld xmlns:a="http://schemas.openxmlformats.org/drawingml/2006/main" xmlns:r="http://schemas.openxmlformats.org/officeDocument/2006/relationships" xmlns:p="http://schemas.openxmlformats.org/presentationml/2006/main">
+  <p:cSld>
+    <p:spTree>
+      <p:nvGrpSpPr>
+        <p:cNvPr id="1" name=""/>
+        <p:cNvGrpSpPr/>
+        <p:nvPr/>
+      </p:nvGrpSpPr>
+      <p:grpSpPr>
+        <a:xfrm>
+          <a:off x="0" y="0"/>
+          <a:ext cx="0" cy="0"/>
+          <a:chOff x="0" y="0"/>
+          <a:chExt cx="0" cy="0"/>
+        </a:xfrm>
+      </p:grpSpPr>
+      <p:sp>
+        <p:nvSpPr>
+          <p:cNvPr id="2" name="Content Placeholder 1"/>
+          <p:cNvSpPr>
+            <a:spLocks noGrp="1"/>
+          </p:cNvSpPr>
+          <p:nvPr>
+            <p:ph idx="1"/>
+          </p:nvPr>
+        </p:nvSpPr>
+        <p:spPr/>
+        <p:txBody>
+          <a:bodyPr/>
+          <a:lstStyle/>
+          <a:p>
+            <a:r>
+              <a:rPr lang="en-GB" dirty="0" smtClean="0"/>
+              <a:t>VM-intern:</a:t>
+            </a:r>
+            <a:endParaRPr lang="en-GB" dirty="0"/>
+          </a:p>
+        </p:txBody>
+      </p:sp>
+      <p:sp>
+        <p:nvSpPr>
+          <p:cNvPr id="3" name="Title 2"/>
+          <p:cNvSpPr>
+            <a:spLocks noGrp="1"/>
+          </p:cNvSpPr>
+          <p:nvPr>
+            <p:ph type="title"/>
+          </p:nvPr>
+        </p:nvSpPr>
+        <p:spPr/>
+        <p:txBody>
+          <a:bodyPr/>
+          <a:lstStyle/>
+          <a:p>
+            <a:r>
+              <a:rPr lang="en-GB" dirty="0" err="1" smtClean="0"/>
+              <a:t>Implizite</a:t>
+            </a:r>
+            <a:r>
+              <a:rPr lang="en-GB" dirty="0" smtClean="0"/>
+              <a:t> </a:t>
+            </a:r>
+            <a:r>
+              <a:rPr lang="en-GB" dirty="0" err="1" smtClean="0"/>
+              <a:t>Typenkonvertierung</a:t>
+            </a:r>
+            <a:endParaRPr lang="en-GB" dirty="0"/>
+          </a:p>
+        </p:txBody>
+      </p:sp>
+      <p:pic>
+        <p:nvPicPr>
+          <p:cNvPr id="4" name="Picture 3" descr="Java - IMLVM/src/ch/fhnw/cpib/vm/Data.java - Eclipse"/>
+          <p:cNvPicPr>
+            <a:picLocks noChangeAspect="1"/>
+          </p:cNvPicPr>
+          <p:nvPr/>
+        </p:nvPicPr>
+        <p:blipFill rotWithShape="1">
+          <a:blip r:embed="rId2">
+            <a:extLst>
+              <a:ext uri="{28A0092B-C50C-407E-A947-70E740481C1C}">
+                <a14:useLocalDpi xmlns:a14="http://schemas.microsoft.com/office/drawing/2010/main" val="0"/>
+              </a:ext>
+            </a:extLst>
+          </a:blip>
+          <a:srcRect l="29074" t="21014" r="38371" b="61386"/>
+          <a:stretch/>
+        </p:blipFill>
+        <p:spPr>
+          <a:xfrm>
+            <a:off x="965606" y="2801720"/>
+            <a:ext cx="7939213" cy="2757831"/>
+          </a:xfrm>
+          <a:prstGeom prst="rect">
+            <a:avLst/>
+          </a:prstGeom>
+        </p:spPr>
+      </p:pic>
+    </p:spTree>
+    <p:extLst>
+      <p:ext uri="{BB962C8B-B14F-4D97-AF65-F5344CB8AC3E}">
+        <p14:creationId xmlns:p14="http://schemas.microsoft.com/office/powerpoint/2010/main" val="4169542813"/>
+      </p:ext>
+    </p:extLst>
+  </p:cSld>
+  <p:clrMapOvr>
+    <a:masterClrMapping/>
+  </p:clrMapOvr>
+  <mc:AlternateContent xmlns:mc="http://schemas.openxmlformats.org/markup-compatibility/2006" xmlns:p14="http://schemas.microsoft.com/office/powerpoint/2010/main">
+    <mc:Choice Requires="p14">
+      <p:transition spd="med" p14:dur="700">
+        <p:fade/>
+      </p:transition>
+    </mc:Choice>
+    <mc:Fallback xmlns="">
+      <p:transition spd="med">
+        <p:fade/>
+      </p:transition>
+    </mc:Fallback>
+  </mc:AlternateContent>
+</p:sld>
+</file>
+
+<file path=ppt/slides/slide9.xml><?xml version="1.0" encoding="utf-8"?>
+<p:sld xmlns:a="http://schemas.openxmlformats.org/drawingml/2006/main" xmlns:r="http://schemas.openxmlformats.org/officeDocument/2006/relationships" xmlns:p="http://schemas.openxmlformats.org/presentationml/2006/main">
+  <p:cSld>
+    <p:spTree>
+      <p:nvGrpSpPr>
+        <p:cNvPr id="1" name=""/>
+        <p:cNvGrpSpPr/>
+        <p:nvPr/>
+      </p:nvGrpSpPr>
+      <p:grpSpPr>
+        <a:xfrm>
+          <a:off x="0" y="0"/>
+          <a:ext cx="0" cy="0"/>
+          <a:chOff x="0" y="0"/>
+          <a:chExt cx="0" cy="0"/>
+        </a:xfrm>
+      </p:grpSpPr>
+      <p:sp>
+        <p:nvSpPr>
+          <p:cNvPr id="2" name="Content Placeholder 1"/>
+          <p:cNvSpPr>
+            <a:spLocks noGrp="1"/>
+          </p:cNvSpPr>
+          <p:nvPr>
+            <p:ph idx="1"/>
+          </p:nvPr>
+        </p:nvSpPr>
+        <p:spPr/>
+        <p:txBody>
+          <a:bodyPr>
+            <a:normAutofit fontScale="85000" lnSpcReduction="20000"/>
+          </a:bodyPr>
+          <a:lstStyle/>
+          <a:p>
+            <a:r>
+              <a:rPr lang="en-GB" dirty="0" err="1" smtClean="0"/>
+              <a:t>Divison</a:t>
+            </a:r>
+            <a:r>
+              <a:rPr lang="en-GB" dirty="0" smtClean="0"/>
+              <a:t> von 5 / 10:</a:t>
+            </a:r>
+            <a:br>
+              <a:rPr lang="en-GB" dirty="0" smtClean="0"/>
+            </a:br>
+            <a:r>
+              <a:rPr lang="en-GB" dirty="0" smtClean="0"/>
+              <a:t>	</a:t>
+            </a:r>
+            <a:r>
+              <a:rPr lang="en-GB" dirty="0" err="1" smtClean="0"/>
+              <a:t>DyadicExpression</a:t>
+            </a:r>
+            <a:r>
+              <a:rPr lang="en-GB" dirty="0" smtClean="0"/>
+              <a:t> </a:t>
+            </a:r>
+            <a:br>
+              <a:rPr lang="en-GB" dirty="0" smtClean="0"/>
+            </a:br>
+            <a:r>
+              <a:rPr lang="en-GB" dirty="0" smtClean="0"/>
+              <a:t>		(</a:t>
+            </a:r>
+            <a:r>
+              <a:rPr lang="en-GB" dirty="0" err="1" smtClean="0"/>
+              <a:t>DivE</a:t>
+            </a:r>
+            <a:r>
+              <a:rPr lang="en-GB" dirty="0" smtClean="0"/>
+              <a:t>,</a:t>
+            </a:r>
+            <a:br>
+              <a:rPr lang="en-GB" dirty="0" smtClean="0"/>
+            </a:br>
+            <a:r>
+              <a:rPr lang="en-GB" dirty="0" smtClean="0"/>
+              <a:t>		 </a:t>
+            </a:r>
+            <a:r>
+              <a:rPr lang="en-GB" dirty="0" err="1" smtClean="0"/>
+              <a:t>LiteralRExpr</a:t>
+            </a:r>
+            <a:r>
+              <a:rPr lang="en-GB" dirty="0" smtClean="0"/>
+              <a:t> (</a:t>
+            </a:r>
+            <a:r>
+              <a:rPr lang="en-GB" dirty="0" err="1" smtClean="0"/>
+              <a:t>IntVal</a:t>
+            </a:r>
+            <a:r>
+              <a:rPr lang="en-GB" dirty="0" smtClean="0"/>
+              <a:t> 5, </a:t>
+            </a:r>
+            <a:r>
+              <a:rPr lang="en-GB" dirty="0" err="1" smtClean="0"/>
+              <a:t>IntType</a:t>
+            </a:r>
+            <a:r>
+              <a:rPr lang="en-GB" dirty="0" smtClean="0"/>
+              <a:t>),</a:t>
+            </a:r>
+            <a:br>
+              <a:rPr lang="en-GB" dirty="0" smtClean="0"/>
+            </a:br>
+            <a:r>
+              <a:rPr lang="en-GB" dirty="0" smtClean="0"/>
+              <a:t>		 </a:t>
+            </a:r>
+            <a:r>
+              <a:rPr lang="en-GB" dirty="0" err="1" smtClean="0"/>
+              <a:t>LiteralRExpr</a:t>
+            </a:r>
+            <a:r>
+              <a:rPr lang="en-GB" dirty="0" smtClean="0"/>
+              <a:t> (</a:t>
+            </a:r>
+            <a:r>
+              <a:rPr lang="en-GB" dirty="0" err="1" smtClean="0"/>
+              <a:t>IntVal</a:t>
+            </a:r>
+            <a:r>
+              <a:rPr lang="en-GB" dirty="0" smtClean="0"/>
+              <a:t> 10, </a:t>
+            </a:r>
+            <a:r>
+              <a:rPr lang="en-GB" dirty="0" err="1" smtClean="0"/>
+              <a:t>IntType</a:t>
+            </a:r>
+            <a:r>
+              <a:rPr lang="en-GB" dirty="0" smtClean="0"/>
+              <a:t>),</a:t>
+            </a:r>
+            <a:br>
+              <a:rPr lang="en-GB" dirty="0" smtClean="0"/>
+            </a:br>
+            <a:r>
+              <a:rPr lang="en-GB" dirty="0" smtClean="0"/>
+              <a:t>		 </a:t>
+            </a:r>
+            <a:r>
+              <a:rPr lang="en-GB" b="1" dirty="0" err="1" smtClean="0"/>
+              <a:t>IntType</a:t>
+            </a:r>
+            <a:r>
+              <a:rPr lang="en-GB" dirty="0" smtClean="0"/>
+              <a:t>)</a:t>
+            </a:r>
+          </a:p>
+          <a:p>
+            <a:endParaRPr lang="en-GB" dirty="0" smtClean="0"/>
+          </a:p>
+          <a:p>
+            <a:r>
+              <a:rPr lang="en-GB" dirty="0" err="1"/>
+              <a:t>m</a:t>
+            </a:r>
+            <a:r>
+              <a:rPr lang="en-GB" dirty="0" err="1" smtClean="0"/>
+              <a:t>it</a:t>
+            </a:r>
+            <a:r>
+              <a:rPr lang="en-GB" dirty="0" smtClean="0"/>
+              <a:t> </a:t>
+            </a:r>
+            <a:r>
+              <a:rPr lang="en-GB" dirty="0" err="1" smtClean="0"/>
+              <a:t>Typenkonvertierung</a:t>
+            </a:r>
+            <a:r>
+              <a:rPr lang="en-GB" dirty="0" smtClean="0"/>
+              <a:t>:</a:t>
+            </a:r>
+            <a:r>
+              <a:rPr lang="en-GB" dirty="0"/>
+              <a:t> </a:t>
+            </a:r>
+            <a:r>
+              <a:rPr lang="en-GB" dirty="0" smtClean="0"/>
+              <a:t>(</a:t>
+            </a:r>
+            <a:r>
+              <a:rPr lang="en-GB" dirty="0" err="1" smtClean="0"/>
+              <a:t>asRatio</a:t>
+            </a:r>
+            <a:r>
+              <a:rPr lang="en-GB" dirty="0" smtClean="0"/>
+              <a:t> 5) / 10</a:t>
+            </a:r>
+          </a:p>
+          <a:p>
+            <a:pPr marL="109728" indent="0">
+              <a:buNone/>
+            </a:pPr>
+            <a:r>
+              <a:rPr lang="en-GB" dirty="0"/>
+              <a:t>	</a:t>
+            </a:r>
+            <a:r>
+              <a:rPr lang="en-GB" dirty="0" err="1"/>
+              <a:t>DyadicExpression</a:t>
+            </a:r>
+            <a:r>
+              <a:rPr lang="en-GB" dirty="0"/>
+              <a:t> </a:t>
+            </a:r>
+            <a:br>
+              <a:rPr lang="en-GB" dirty="0"/>
+            </a:br>
+            <a:r>
+              <a:rPr lang="en-GB" dirty="0"/>
+              <a:t>		(</a:t>
+            </a:r>
+            <a:r>
+              <a:rPr lang="en-GB" dirty="0" err="1"/>
+              <a:t>DivE</a:t>
+            </a:r>
+            <a:r>
+              <a:rPr lang="en-GB" dirty="0"/>
+              <a:t>,</a:t>
+            </a:r>
+            <a:br>
+              <a:rPr lang="en-GB" dirty="0"/>
+            </a:br>
+            <a:r>
+              <a:rPr lang="en-GB" dirty="0"/>
+              <a:t>		 </a:t>
+            </a:r>
+            <a:r>
+              <a:rPr lang="en-GB" dirty="0" err="1"/>
+              <a:t>LiteralRExpr</a:t>
+            </a:r>
+            <a:r>
+              <a:rPr lang="en-GB" dirty="0"/>
+              <a:t> (</a:t>
+            </a:r>
+            <a:r>
+              <a:rPr lang="en-GB" dirty="0" err="1"/>
+              <a:t>IntVal</a:t>
+            </a:r>
+            <a:r>
+              <a:rPr lang="en-GB" dirty="0"/>
+              <a:t> 5, </a:t>
+            </a:r>
+            <a:r>
+              <a:rPr lang="en-GB" dirty="0" err="1" smtClean="0"/>
+              <a:t>RatioType</a:t>
+            </a:r>
+            <a:r>
+              <a:rPr lang="en-GB" dirty="0" smtClean="0"/>
+              <a:t>),</a:t>
+            </a:r>
+            <a:r>
+              <a:rPr lang="en-GB" dirty="0"/>
+              <a:t/>
+            </a:r>
+            <a:br>
+              <a:rPr lang="en-GB" dirty="0"/>
+            </a:br>
+            <a:r>
+              <a:rPr lang="en-GB" dirty="0"/>
+              <a:t>		 </a:t>
+            </a:r>
+            <a:r>
+              <a:rPr lang="en-GB" dirty="0" err="1"/>
+              <a:t>LiteralRExpr</a:t>
+            </a:r>
+            <a:r>
+              <a:rPr lang="en-GB" dirty="0"/>
+              <a:t> (</a:t>
+            </a:r>
+            <a:r>
+              <a:rPr lang="en-GB" dirty="0" err="1"/>
+              <a:t>IntVal</a:t>
+            </a:r>
+            <a:r>
+              <a:rPr lang="en-GB" dirty="0"/>
+              <a:t> 10, </a:t>
+            </a:r>
+            <a:r>
+              <a:rPr lang="en-GB" dirty="0" err="1"/>
+              <a:t>IntType</a:t>
+            </a:r>
+            <a:r>
+              <a:rPr lang="en-GB" dirty="0"/>
+              <a:t>),</a:t>
+            </a:r>
+            <a:br>
+              <a:rPr lang="en-GB" dirty="0"/>
+            </a:br>
+            <a:r>
+              <a:rPr lang="en-GB" dirty="0"/>
+              <a:t>		 </a:t>
+            </a:r>
+            <a:r>
+              <a:rPr lang="en-GB" b="1" dirty="0" err="1" smtClean="0"/>
+              <a:t>RatioType</a:t>
+            </a:r>
+            <a:r>
+              <a:rPr lang="en-GB" dirty="0" smtClean="0"/>
+              <a:t>)</a:t>
+            </a:r>
+          </a:p>
+        </p:txBody>
+      </p:sp>
+      <p:sp>
+        <p:nvSpPr>
+          <p:cNvPr id="3" name="Title 2"/>
+          <p:cNvSpPr>
+            <a:spLocks noGrp="1"/>
+          </p:cNvSpPr>
+          <p:nvPr>
+            <p:ph type="title"/>
+          </p:nvPr>
+        </p:nvSpPr>
+        <p:spPr/>
+        <p:txBody>
+          <a:bodyPr/>
+          <a:lstStyle/>
+          <a:p>
+            <a:r>
+              <a:rPr lang="en-GB" dirty="0" err="1" smtClean="0"/>
+              <a:t>Explizite</a:t>
+            </a:r>
+            <a:r>
+              <a:rPr lang="en-GB" dirty="0" smtClean="0"/>
+              <a:t> </a:t>
+            </a:r>
+            <a:r>
+              <a:rPr lang="en-GB" dirty="0" err="1" smtClean="0"/>
+              <a:t>Typenkonvertierung</a:t>
+            </a:r>
+            <a:endParaRPr lang="en-GB" dirty="0"/>
+          </a:p>
+        </p:txBody>
+      </p:sp>
+      <p:sp>
+        <p:nvSpPr>
+          <p:cNvPr id="4" name="TextBox 3"/>
+          <p:cNvSpPr txBox="1"/>
+          <p:nvPr/>
+        </p:nvSpPr>
+        <p:spPr>
+          <a:xfrm>
+            <a:off x="7629754" y="2969971"/>
+            <a:ext cx="3189427" cy="830997"/>
+          </a:xfrm>
+          <a:prstGeom prst="rect">
+            <a:avLst/>
+          </a:prstGeom>
+          <a:noFill/>
+        </p:spPr>
+        <p:txBody>
+          <a:bodyPr wrap="square" rtlCol="0">
+            <a:spAutoFit/>
+          </a:bodyPr>
+          <a:lstStyle/>
+          <a:p>
+            <a:r>
+              <a:rPr lang="en-GB" sz="2400" i="1" dirty="0" err="1">
+                <a:solidFill>
+                  <a:schemeClr val="tx2"/>
+                </a:solidFill>
+              </a:rPr>
+              <a:t>Instruktion</a:t>
+            </a:r>
+            <a:r>
+              <a:rPr lang="en-GB" sz="2400" i="1" dirty="0">
+                <a:solidFill>
+                  <a:schemeClr val="tx2"/>
+                </a:solidFill>
+              </a:rPr>
+              <a:t>: </a:t>
+            </a:r>
+            <a:r>
+              <a:rPr lang="en-GB" sz="2400" i="1" dirty="0" err="1" smtClean="0">
+                <a:solidFill>
+                  <a:schemeClr val="tx2"/>
+                </a:solidFill>
+              </a:rPr>
+              <a:t>DivTruncInt</a:t>
+            </a:r>
+            <a:endParaRPr lang="en-GB" sz="2400" i="1" dirty="0" smtClean="0">
+              <a:solidFill>
+                <a:schemeClr val="tx2"/>
+              </a:solidFill>
+            </a:endParaRPr>
+          </a:p>
+          <a:p>
+            <a:r>
+              <a:rPr lang="en-GB" sz="2400" i="1" dirty="0" err="1" smtClean="0">
+                <a:solidFill>
+                  <a:schemeClr val="tx2"/>
+                </a:solidFill>
+              </a:rPr>
+              <a:t>Resultat</a:t>
+            </a:r>
+            <a:r>
+              <a:rPr lang="en-GB" sz="2400" i="1" dirty="0" smtClean="0">
+                <a:solidFill>
+                  <a:schemeClr val="tx2"/>
+                </a:solidFill>
+              </a:rPr>
+              <a:t>: </a:t>
+            </a:r>
+            <a:r>
+              <a:rPr lang="en-GB" sz="2400" i="1" dirty="0" err="1" smtClean="0">
+                <a:solidFill>
+                  <a:schemeClr val="tx2"/>
+                </a:solidFill>
+              </a:rPr>
+              <a:t>Int</a:t>
+            </a:r>
+            <a:r>
+              <a:rPr lang="en-GB" sz="2400" i="1" dirty="0" smtClean="0">
+                <a:solidFill>
+                  <a:schemeClr val="tx2"/>
+                </a:solidFill>
+              </a:rPr>
+              <a:t> 0</a:t>
+            </a:r>
+            <a:endParaRPr lang="en-GB" sz="2400" i="1" dirty="0">
+              <a:solidFill>
+                <a:schemeClr val="tx2"/>
+              </a:solidFill>
+            </a:endParaRPr>
+          </a:p>
+        </p:txBody>
+      </p:sp>
+      <p:sp>
+        <p:nvSpPr>
+          <p:cNvPr id="5" name="TextBox 4"/>
+          <p:cNvSpPr txBox="1"/>
+          <p:nvPr/>
+        </p:nvSpPr>
+        <p:spPr>
+          <a:xfrm>
+            <a:off x="7629753" y="4958486"/>
+            <a:ext cx="3189427" cy="830997"/>
+          </a:xfrm>
+          <a:prstGeom prst="rect">
+            <a:avLst/>
+          </a:prstGeom>
+          <a:noFill/>
+        </p:spPr>
+        <p:txBody>
+          <a:bodyPr wrap="square" rtlCol="0">
+            <a:spAutoFit/>
+          </a:bodyPr>
+          <a:lstStyle/>
+          <a:p>
+            <a:r>
+              <a:rPr lang="en-GB" sz="2400" i="1" dirty="0" err="1">
+                <a:solidFill>
+                  <a:schemeClr val="tx2"/>
+                </a:solidFill>
+              </a:rPr>
+              <a:t>Instruktion</a:t>
+            </a:r>
+            <a:r>
+              <a:rPr lang="en-GB" sz="2400" i="1" dirty="0">
+                <a:solidFill>
+                  <a:schemeClr val="tx2"/>
+                </a:solidFill>
+              </a:rPr>
+              <a:t>: </a:t>
+            </a:r>
+            <a:r>
+              <a:rPr lang="en-GB" sz="2400" i="1" dirty="0" err="1" smtClean="0">
+                <a:solidFill>
+                  <a:schemeClr val="tx2"/>
+                </a:solidFill>
+              </a:rPr>
+              <a:t>DivRatio</a:t>
+            </a:r>
+            <a:r>
+              <a:rPr lang="en-GB" sz="2400" i="1" dirty="0" smtClean="0">
+                <a:solidFill>
+                  <a:schemeClr val="tx2"/>
+                </a:solidFill>
+              </a:rPr>
+              <a:t/>
+            </a:r>
+            <a:br>
+              <a:rPr lang="en-GB" sz="2400" i="1" dirty="0" smtClean="0">
+                <a:solidFill>
+                  <a:schemeClr val="tx2"/>
+                </a:solidFill>
+              </a:rPr>
+            </a:br>
+            <a:r>
+              <a:rPr lang="en-GB" sz="2400" i="1" dirty="0" err="1" smtClean="0">
+                <a:solidFill>
+                  <a:schemeClr val="tx2"/>
+                </a:solidFill>
+              </a:rPr>
+              <a:t>Resultat</a:t>
+            </a:r>
+            <a:r>
+              <a:rPr lang="en-GB" sz="2400" i="1" dirty="0" smtClean="0">
+                <a:solidFill>
+                  <a:schemeClr val="tx2"/>
+                </a:solidFill>
+              </a:rPr>
+              <a:t>: Ratio 1 2 -&gt; ½ </a:t>
+            </a:r>
+            <a:endParaRPr lang="en-GB" sz="2400" i="1" dirty="0">
+              <a:solidFill>
+                <a:schemeClr val="tx2"/>
+              </a:solidFill>
+            </a:endParaRPr>
+          </a:p>
+        </p:txBody>
+      </p:sp>
+    </p:spTree>
+    <p:extLst>
+      <p:ext uri="{BB962C8B-B14F-4D97-AF65-F5344CB8AC3E}">
+        <p14:creationId xmlns:p14="http://schemas.microsoft.com/office/powerpoint/2010/main" val="1572459025"/>
       </p:ext>
     </p:extLst>
   </p:cSld>

</xml_diff>